<commit_message>
binary search tree delete
</commit_message>
<xml_diff>
--- a/binarySearchTree/binarySearchTree.pptx
+++ b/binarySearchTree/binarySearchTree.pptx
@@ -5,11 +5,17 @@
     <p:sldMasterId id="2147483648" r:id="rId1"/>
   </p:sldMasterIdLst>
   <p:notesMasterIdLst>
-    <p:notesMasterId r:id="rId4"/>
+    <p:notesMasterId r:id="rId10"/>
   </p:notesMasterIdLst>
   <p:sldIdLst>
     <p:sldId id="268" r:id="rId2"/>
     <p:sldId id="269" r:id="rId3"/>
+    <p:sldId id="270" r:id="rId4"/>
+    <p:sldId id="271" r:id="rId5"/>
+    <p:sldId id="272" r:id="rId6"/>
+    <p:sldId id="273" r:id="rId7"/>
+    <p:sldId id="274" r:id="rId8"/>
+    <p:sldId id="275" r:id="rId9"/>
   </p:sldIdLst>
   <p:sldSz cx="12192000" cy="6858000"/>
   <p:notesSz cx="6858000" cy="9144000"/>
@@ -198,7 +204,7 @@
           <a:p>
             <a:fld id="{EF89B589-35CB-4095-89F3-CBA9C3D5C94E}" type="datetimeFigureOut">
               <a:rPr lang="ko-KR" altLang="en-US" smtClean="0"/>
-              <a:t>2022-04-07 Thu요일</a:t>
+              <a:t>2022-04-08 Fri요일</a:t>
             </a:fld>
             <a:endParaRPr lang="ko-KR" altLang="en-US"/>
           </a:p>
@@ -612,7 +618,7 @@
           <a:p>
             <a:fld id="{3F5DACAA-BDF7-41DD-B2E5-E4E78D96A16D}" type="datetimeFigureOut">
               <a:rPr lang="ko-KR" altLang="en-US" smtClean="0"/>
-              <a:t>2022-04-07 Thu요일</a:t>
+              <a:t>2022-04-08 Fri요일</a:t>
             </a:fld>
             <a:endParaRPr lang="ko-KR" altLang="en-US"/>
           </a:p>
@@ -810,7 +816,7 @@
           <a:p>
             <a:fld id="{3F5DACAA-BDF7-41DD-B2E5-E4E78D96A16D}" type="datetimeFigureOut">
               <a:rPr lang="ko-KR" altLang="en-US" smtClean="0"/>
-              <a:t>2022-04-07 Thu요일</a:t>
+              <a:t>2022-04-08 Fri요일</a:t>
             </a:fld>
             <a:endParaRPr lang="ko-KR" altLang="en-US"/>
           </a:p>
@@ -1018,7 +1024,7 @@
           <a:p>
             <a:fld id="{3F5DACAA-BDF7-41DD-B2E5-E4E78D96A16D}" type="datetimeFigureOut">
               <a:rPr lang="ko-KR" altLang="en-US" smtClean="0"/>
-              <a:t>2022-04-07 Thu요일</a:t>
+              <a:t>2022-04-08 Fri요일</a:t>
             </a:fld>
             <a:endParaRPr lang="ko-KR" altLang="en-US"/>
           </a:p>
@@ -1216,7 +1222,7 @@
           <a:p>
             <a:fld id="{3F5DACAA-BDF7-41DD-B2E5-E4E78D96A16D}" type="datetimeFigureOut">
               <a:rPr lang="ko-KR" altLang="en-US" smtClean="0"/>
-              <a:t>2022-04-07 Thu요일</a:t>
+              <a:t>2022-04-08 Fri요일</a:t>
             </a:fld>
             <a:endParaRPr lang="ko-KR" altLang="en-US"/>
           </a:p>
@@ -1491,7 +1497,7 @@
           <a:p>
             <a:fld id="{3F5DACAA-BDF7-41DD-B2E5-E4E78D96A16D}" type="datetimeFigureOut">
               <a:rPr lang="ko-KR" altLang="en-US" smtClean="0"/>
-              <a:t>2022-04-07 Thu요일</a:t>
+              <a:t>2022-04-08 Fri요일</a:t>
             </a:fld>
             <a:endParaRPr lang="ko-KR" altLang="en-US"/>
           </a:p>
@@ -1756,7 +1762,7 @@
           <a:p>
             <a:fld id="{3F5DACAA-BDF7-41DD-B2E5-E4E78D96A16D}" type="datetimeFigureOut">
               <a:rPr lang="ko-KR" altLang="en-US" smtClean="0"/>
-              <a:t>2022-04-07 Thu요일</a:t>
+              <a:t>2022-04-08 Fri요일</a:t>
             </a:fld>
             <a:endParaRPr lang="ko-KR" altLang="en-US"/>
           </a:p>
@@ -2168,7 +2174,7 @@
           <a:p>
             <a:fld id="{3F5DACAA-BDF7-41DD-B2E5-E4E78D96A16D}" type="datetimeFigureOut">
               <a:rPr lang="ko-KR" altLang="en-US" smtClean="0"/>
-              <a:t>2022-04-07 Thu요일</a:t>
+              <a:t>2022-04-08 Fri요일</a:t>
             </a:fld>
             <a:endParaRPr lang="ko-KR" altLang="en-US"/>
           </a:p>
@@ -2309,7 +2315,7 @@
           <a:p>
             <a:fld id="{3F5DACAA-BDF7-41DD-B2E5-E4E78D96A16D}" type="datetimeFigureOut">
               <a:rPr lang="ko-KR" altLang="en-US" smtClean="0"/>
-              <a:t>2022-04-07 Thu요일</a:t>
+              <a:t>2022-04-08 Fri요일</a:t>
             </a:fld>
             <a:endParaRPr lang="ko-KR" altLang="en-US"/>
           </a:p>
@@ -2422,7 +2428,7 @@
           <a:p>
             <a:fld id="{3F5DACAA-BDF7-41DD-B2E5-E4E78D96A16D}" type="datetimeFigureOut">
               <a:rPr lang="ko-KR" altLang="en-US" smtClean="0"/>
-              <a:t>2022-04-07 Thu요일</a:t>
+              <a:t>2022-04-08 Fri요일</a:t>
             </a:fld>
             <a:endParaRPr lang="ko-KR" altLang="en-US"/>
           </a:p>
@@ -2733,7 +2739,7 @@
           <a:p>
             <a:fld id="{3F5DACAA-BDF7-41DD-B2E5-E4E78D96A16D}" type="datetimeFigureOut">
               <a:rPr lang="ko-KR" altLang="en-US" smtClean="0"/>
-              <a:t>2022-04-07 Thu요일</a:t>
+              <a:t>2022-04-08 Fri요일</a:t>
             </a:fld>
             <a:endParaRPr lang="ko-KR" altLang="en-US"/>
           </a:p>
@@ -3021,7 +3027,7 @@
           <a:p>
             <a:fld id="{3F5DACAA-BDF7-41DD-B2E5-E4E78D96A16D}" type="datetimeFigureOut">
               <a:rPr lang="ko-KR" altLang="en-US" smtClean="0"/>
-              <a:t>2022-04-07 Thu요일</a:t>
+              <a:t>2022-04-08 Fri요일</a:t>
             </a:fld>
             <a:endParaRPr lang="ko-KR" altLang="en-US"/>
           </a:p>
@@ -3262,7 +3268,7 @@
           <a:p>
             <a:fld id="{3F5DACAA-BDF7-41DD-B2E5-E4E78D96A16D}" type="datetimeFigureOut">
               <a:rPr lang="ko-KR" altLang="en-US" smtClean="0"/>
-              <a:t>2022-04-07 Thu요일</a:t>
+              <a:t>2022-04-08 Fri요일</a:t>
             </a:fld>
             <a:endParaRPr lang="ko-KR" altLang="en-US"/>
           </a:p>
@@ -4839,7 +4845,7 @@
           <a:p>
             <a:r>
               <a:rPr lang="en-US" altLang="ko-KR" dirty="0"/>
-              <a:t>2) 6 &gt; 5</a:t>
+              <a:t>3) 6 &gt; 5</a:t>
             </a:r>
             <a:endParaRPr lang="ko-KR" altLang="en-US" dirty="0"/>
           </a:p>
@@ -5020,6 +5026,3543 @@
     <p:extLst>
       <p:ext uri="{BB962C8B-B14F-4D97-AF65-F5344CB8AC3E}">
         <p14:creationId xmlns:p14="http://schemas.microsoft.com/office/powerpoint/2010/main" val="1747325213"/>
+      </p:ext>
+    </p:extLst>
+  </p:cSld>
+  <p:clrMapOvr>
+    <a:masterClrMapping/>
+  </p:clrMapOvr>
+</p:sld>
+</file>
+
+<file path=ppt/slides/slide3.xml><?xml version="1.0" encoding="utf-8"?>
+<p:sld xmlns:a="http://schemas.openxmlformats.org/drawingml/2006/main" xmlns:r="http://schemas.openxmlformats.org/officeDocument/2006/relationships" xmlns:p="http://schemas.openxmlformats.org/presentationml/2006/main">
+  <p:cSld>
+    <p:spTree>
+      <p:nvGrpSpPr>
+        <p:cNvPr id="1" name=""/>
+        <p:cNvGrpSpPr/>
+        <p:nvPr/>
+      </p:nvGrpSpPr>
+      <p:grpSpPr>
+        <a:xfrm>
+          <a:off x="0" y="0"/>
+          <a:ext cx="0" cy="0"/>
+          <a:chOff x="0" y="0"/>
+          <a:chExt cx="0" cy="0"/>
+        </a:xfrm>
+      </p:grpSpPr>
+      <p:sp>
+        <p:nvSpPr>
+          <p:cNvPr id="42" name="타원 41">
+            <a:extLst>
+              <a:ext uri="{FF2B5EF4-FFF2-40B4-BE49-F238E27FC236}">
+                <a16:creationId xmlns:a16="http://schemas.microsoft.com/office/drawing/2014/main" id="{92ABCDEC-250B-40C0-8812-8B9257F6B78D}"/>
+              </a:ext>
+            </a:extLst>
+          </p:cNvPr>
+          <p:cNvSpPr/>
+          <p:nvPr/>
+        </p:nvSpPr>
+        <p:spPr>
+          <a:xfrm>
+            <a:off x="5565748" y="1259131"/>
+            <a:ext cx="842962" cy="814387"/>
+          </a:xfrm>
+          <a:prstGeom prst="ellipse">
+            <a:avLst/>
+          </a:prstGeom>
+          <a:noFill/>
+        </p:spPr>
+        <p:style>
+          <a:lnRef idx="2">
+            <a:schemeClr val="dk1">
+              <a:shade val="50000"/>
+            </a:schemeClr>
+          </a:lnRef>
+          <a:fillRef idx="1">
+            <a:schemeClr val="dk1"/>
+          </a:fillRef>
+          <a:effectRef idx="0">
+            <a:schemeClr val="dk1"/>
+          </a:effectRef>
+          <a:fontRef idx="minor">
+            <a:schemeClr val="lt1"/>
+          </a:fontRef>
+        </p:style>
+        <p:txBody>
+          <a:bodyPr rtlCol="0" anchor="ctr"/>
+          <a:lstStyle/>
+          <a:p>
+            <a:pPr algn="ctr"/>
+            <a:r>
+              <a:rPr lang="en-US" altLang="ko-KR" sz="3200" dirty="0">
+                <a:solidFill>
+                  <a:schemeClr val="tx1"/>
+                </a:solidFill>
+              </a:rPr>
+              <a:t>7</a:t>
+            </a:r>
+            <a:endParaRPr lang="ko-KR" altLang="en-US" sz="3200" dirty="0">
+              <a:solidFill>
+                <a:schemeClr val="tx1"/>
+              </a:solidFill>
+            </a:endParaRPr>
+          </a:p>
+        </p:txBody>
+      </p:sp>
+      <p:sp>
+        <p:nvSpPr>
+          <p:cNvPr id="47" name="타원 46">
+            <a:extLst>
+              <a:ext uri="{FF2B5EF4-FFF2-40B4-BE49-F238E27FC236}">
+                <a16:creationId xmlns:a16="http://schemas.microsoft.com/office/drawing/2014/main" id="{91893471-6591-4ACE-B7FD-2FE3D7EBE3A9}"/>
+              </a:ext>
+            </a:extLst>
+          </p:cNvPr>
+          <p:cNvSpPr/>
+          <p:nvPr/>
+        </p:nvSpPr>
+        <p:spPr>
+          <a:xfrm>
+            <a:off x="4120446" y="2859328"/>
+            <a:ext cx="842962" cy="814387"/>
+          </a:xfrm>
+          <a:prstGeom prst="ellipse">
+            <a:avLst/>
+          </a:prstGeom>
+          <a:noFill/>
+        </p:spPr>
+        <p:style>
+          <a:lnRef idx="2">
+            <a:schemeClr val="dk1">
+              <a:shade val="50000"/>
+            </a:schemeClr>
+          </a:lnRef>
+          <a:fillRef idx="1">
+            <a:schemeClr val="dk1"/>
+          </a:fillRef>
+          <a:effectRef idx="0">
+            <a:schemeClr val="dk1"/>
+          </a:effectRef>
+          <a:fontRef idx="minor">
+            <a:schemeClr val="lt1"/>
+          </a:fontRef>
+        </p:style>
+        <p:txBody>
+          <a:bodyPr rtlCol="0" anchor="ctr"/>
+          <a:lstStyle/>
+          <a:p>
+            <a:pPr algn="ctr"/>
+            <a:r>
+              <a:rPr lang="en-US" altLang="ko-KR" sz="3200" dirty="0">
+                <a:solidFill>
+                  <a:schemeClr val="tx1"/>
+                </a:solidFill>
+              </a:rPr>
+              <a:t>3</a:t>
+            </a:r>
+            <a:endParaRPr lang="ko-KR" altLang="en-US" sz="3200" dirty="0">
+              <a:solidFill>
+                <a:schemeClr val="tx1"/>
+              </a:solidFill>
+            </a:endParaRPr>
+          </a:p>
+        </p:txBody>
+      </p:sp>
+      <p:sp>
+        <p:nvSpPr>
+          <p:cNvPr id="48" name="타원 47">
+            <a:extLst>
+              <a:ext uri="{FF2B5EF4-FFF2-40B4-BE49-F238E27FC236}">
+                <a16:creationId xmlns:a16="http://schemas.microsoft.com/office/drawing/2014/main" id="{75833488-1488-4FC6-9393-C43992CEFD09}"/>
+              </a:ext>
+            </a:extLst>
+          </p:cNvPr>
+          <p:cNvSpPr/>
+          <p:nvPr/>
+        </p:nvSpPr>
+        <p:spPr>
+          <a:xfrm>
+            <a:off x="7110820" y="2859328"/>
+            <a:ext cx="842962" cy="814387"/>
+          </a:xfrm>
+          <a:prstGeom prst="ellipse">
+            <a:avLst/>
+          </a:prstGeom>
+          <a:noFill/>
+        </p:spPr>
+        <p:style>
+          <a:lnRef idx="2">
+            <a:schemeClr val="dk1">
+              <a:shade val="50000"/>
+            </a:schemeClr>
+          </a:lnRef>
+          <a:fillRef idx="1">
+            <a:schemeClr val="dk1"/>
+          </a:fillRef>
+          <a:effectRef idx="0">
+            <a:schemeClr val="dk1"/>
+          </a:effectRef>
+          <a:fontRef idx="minor">
+            <a:schemeClr val="lt1"/>
+          </a:fontRef>
+        </p:style>
+        <p:txBody>
+          <a:bodyPr rtlCol="0" anchor="ctr"/>
+          <a:lstStyle/>
+          <a:p>
+            <a:pPr algn="ctr"/>
+            <a:r>
+              <a:rPr lang="en-US" altLang="ko-KR" sz="3200" dirty="0">
+                <a:solidFill>
+                  <a:schemeClr val="tx1"/>
+                </a:solidFill>
+              </a:rPr>
+              <a:t>8</a:t>
+            </a:r>
+            <a:endParaRPr lang="ko-KR" altLang="en-US" sz="3200" dirty="0">
+              <a:solidFill>
+                <a:schemeClr val="tx1"/>
+              </a:solidFill>
+            </a:endParaRPr>
+          </a:p>
+        </p:txBody>
+      </p:sp>
+      <p:sp>
+        <p:nvSpPr>
+          <p:cNvPr id="50" name="타원 49">
+            <a:extLst>
+              <a:ext uri="{FF2B5EF4-FFF2-40B4-BE49-F238E27FC236}">
+                <a16:creationId xmlns:a16="http://schemas.microsoft.com/office/drawing/2014/main" id="{88AB90D7-60C5-42FD-B488-DB1174256B19}"/>
+              </a:ext>
+            </a:extLst>
+          </p:cNvPr>
+          <p:cNvSpPr/>
+          <p:nvPr/>
+        </p:nvSpPr>
+        <p:spPr>
+          <a:xfrm>
+            <a:off x="5227252" y="4402382"/>
+            <a:ext cx="842962" cy="814387"/>
+          </a:xfrm>
+          <a:prstGeom prst="ellipse">
+            <a:avLst/>
+          </a:prstGeom>
+          <a:noFill/>
+        </p:spPr>
+        <p:style>
+          <a:lnRef idx="2">
+            <a:schemeClr val="dk1">
+              <a:shade val="50000"/>
+            </a:schemeClr>
+          </a:lnRef>
+          <a:fillRef idx="1">
+            <a:schemeClr val="dk1"/>
+          </a:fillRef>
+          <a:effectRef idx="0">
+            <a:schemeClr val="dk1"/>
+          </a:effectRef>
+          <a:fontRef idx="minor">
+            <a:schemeClr val="lt1"/>
+          </a:fontRef>
+        </p:style>
+        <p:txBody>
+          <a:bodyPr rtlCol="0" anchor="ctr"/>
+          <a:lstStyle/>
+          <a:p>
+            <a:pPr algn="ctr"/>
+            <a:r>
+              <a:rPr lang="en-US" altLang="ko-KR" sz="3200" dirty="0">
+                <a:solidFill>
+                  <a:schemeClr val="tx1"/>
+                </a:solidFill>
+              </a:rPr>
+              <a:t>5</a:t>
+            </a:r>
+            <a:endParaRPr lang="ko-KR" altLang="en-US" sz="3200" dirty="0">
+              <a:solidFill>
+                <a:schemeClr val="tx1"/>
+              </a:solidFill>
+            </a:endParaRPr>
+          </a:p>
+        </p:txBody>
+      </p:sp>
+      <p:sp>
+        <p:nvSpPr>
+          <p:cNvPr id="51" name="타원 50">
+            <a:extLst>
+              <a:ext uri="{FF2B5EF4-FFF2-40B4-BE49-F238E27FC236}">
+                <a16:creationId xmlns:a16="http://schemas.microsoft.com/office/drawing/2014/main" id="{76613553-D7D1-454D-A29D-7E72623E935E}"/>
+              </a:ext>
+            </a:extLst>
+          </p:cNvPr>
+          <p:cNvSpPr/>
+          <p:nvPr/>
+        </p:nvSpPr>
+        <p:spPr>
+          <a:xfrm>
+            <a:off x="3013643" y="4402382"/>
+            <a:ext cx="842962" cy="814387"/>
+          </a:xfrm>
+          <a:prstGeom prst="ellipse">
+            <a:avLst/>
+          </a:prstGeom>
+          <a:noFill/>
+        </p:spPr>
+        <p:style>
+          <a:lnRef idx="2">
+            <a:schemeClr val="dk1">
+              <a:shade val="50000"/>
+            </a:schemeClr>
+          </a:lnRef>
+          <a:fillRef idx="1">
+            <a:schemeClr val="dk1"/>
+          </a:fillRef>
+          <a:effectRef idx="0">
+            <a:schemeClr val="dk1"/>
+          </a:effectRef>
+          <a:fontRef idx="minor">
+            <a:schemeClr val="lt1"/>
+          </a:fontRef>
+        </p:style>
+        <p:txBody>
+          <a:bodyPr rtlCol="0" anchor="ctr"/>
+          <a:lstStyle/>
+          <a:p>
+            <a:pPr algn="ctr"/>
+            <a:r>
+              <a:rPr lang="en-US" altLang="ko-KR" sz="3200" dirty="0">
+                <a:solidFill>
+                  <a:schemeClr val="tx1"/>
+                </a:solidFill>
+              </a:rPr>
+              <a:t>1</a:t>
+            </a:r>
+            <a:endParaRPr lang="ko-KR" altLang="en-US" sz="3200" dirty="0">
+              <a:solidFill>
+                <a:schemeClr val="tx1"/>
+              </a:solidFill>
+            </a:endParaRPr>
+          </a:p>
+        </p:txBody>
+      </p:sp>
+      <p:cxnSp>
+        <p:nvCxnSpPr>
+          <p:cNvPr id="16" name="직선 연결선 15">
+            <a:extLst>
+              <a:ext uri="{FF2B5EF4-FFF2-40B4-BE49-F238E27FC236}">
+                <a16:creationId xmlns:a16="http://schemas.microsoft.com/office/drawing/2014/main" id="{A5DC94D9-2D54-4AFF-96DD-C4484055E7A6}"/>
+              </a:ext>
+            </a:extLst>
+          </p:cNvPr>
+          <p:cNvCxnSpPr>
+            <a:stCxn id="42" idx="3"/>
+            <a:endCxn id="47" idx="0"/>
+          </p:cNvCxnSpPr>
+          <p:nvPr/>
+        </p:nvCxnSpPr>
+        <p:spPr>
+          <a:xfrm flipH="1">
+            <a:off x="4541927" y="1954254"/>
+            <a:ext cx="1147270" cy="905074"/>
+          </a:xfrm>
+          <a:prstGeom prst="line">
+            <a:avLst/>
+          </a:prstGeom>
+        </p:spPr>
+        <p:style>
+          <a:lnRef idx="1">
+            <a:schemeClr val="dk1"/>
+          </a:lnRef>
+          <a:fillRef idx="0">
+            <a:schemeClr val="dk1"/>
+          </a:fillRef>
+          <a:effectRef idx="0">
+            <a:schemeClr val="dk1"/>
+          </a:effectRef>
+          <a:fontRef idx="minor">
+            <a:schemeClr val="tx1"/>
+          </a:fontRef>
+        </p:style>
+      </p:cxnSp>
+      <p:cxnSp>
+        <p:nvCxnSpPr>
+          <p:cNvPr id="18" name="직선 연결선 17">
+            <a:extLst>
+              <a:ext uri="{FF2B5EF4-FFF2-40B4-BE49-F238E27FC236}">
+                <a16:creationId xmlns:a16="http://schemas.microsoft.com/office/drawing/2014/main" id="{7F131259-FAE2-4864-8844-285D43D73BBB}"/>
+              </a:ext>
+            </a:extLst>
+          </p:cNvPr>
+          <p:cNvCxnSpPr>
+            <a:stCxn id="47" idx="3"/>
+            <a:endCxn id="51" idx="0"/>
+          </p:cNvCxnSpPr>
+          <p:nvPr/>
+        </p:nvCxnSpPr>
+        <p:spPr>
+          <a:xfrm flipH="1">
+            <a:off x="3435124" y="3554451"/>
+            <a:ext cx="808771" cy="847931"/>
+          </a:xfrm>
+          <a:prstGeom prst="line">
+            <a:avLst/>
+          </a:prstGeom>
+        </p:spPr>
+        <p:style>
+          <a:lnRef idx="1">
+            <a:schemeClr val="dk1"/>
+          </a:lnRef>
+          <a:fillRef idx="0">
+            <a:schemeClr val="dk1"/>
+          </a:fillRef>
+          <a:effectRef idx="0">
+            <a:schemeClr val="dk1"/>
+          </a:effectRef>
+          <a:fontRef idx="minor">
+            <a:schemeClr val="tx1"/>
+          </a:fontRef>
+        </p:style>
+      </p:cxnSp>
+      <p:cxnSp>
+        <p:nvCxnSpPr>
+          <p:cNvPr id="20" name="직선 연결선 19">
+            <a:extLst>
+              <a:ext uri="{FF2B5EF4-FFF2-40B4-BE49-F238E27FC236}">
+                <a16:creationId xmlns:a16="http://schemas.microsoft.com/office/drawing/2014/main" id="{0B8E17D1-D681-4B9F-836B-B5D5C002EB81}"/>
+              </a:ext>
+            </a:extLst>
+          </p:cNvPr>
+          <p:cNvCxnSpPr>
+            <a:stCxn id="47" idx="5"/>
+            <a:endCxn id="50" idx="0"/>
+          </p:cNvCxnSpPr>
+          <p:nvPr/>
+        </p:nvCxnSpPr>
+        <p:spPr>
+          <a:xfrm>
+            <a:off x="4839959" y="3554451"/>
+            <a:ext cx="808774" cy="847931"/>
+          </a:xfrm>
+          <a:prstGeom prst="line">
+            <a:avLst/>
+          </a:prstGeom>
+        </p:spPr>
+        <p:style>
+          <a:lnRef idx="1">
+            <a:schemeClr val="dk1"/>
+          </a:lnRef>
+          <a:fillRef idx="0">
+            <a:schemeClr val="dk1"/>
+          </a:fillRef>
+          <a:effectRef idx="0">
+            <a:schemeClr val="dk1"/>
+          </a:effectRef>
+          <a:fontRef idx="minor">
+            <a:schemeClr val="tx1"/>
+          </a:fontRef>
+        </p:style>
+      </p:cxnSp>
+      <p:cxnSp>
+        <p:nvCxnSpPr>
+          <p:cNvPr id="29" name="직선 연결선 28">
+            <a:extLst>
+              <a:ext uri="{FF2B5EF4-FFF2-40B4-BE49-F238E27FC236}">
+                <a16:creationId xmlns:a16="http://schemas.microsoft.com/office/drawing/2014/main" id="{BC052159-12D0-4300-8B07-890AF53A1396}"/>
+              </a:ext>
+            </a:extLst>
+          </p:cNvPr>
+          <p:cNvCxnSpPr>
+            <a:stCxn id="42" idx="5"/>
+            <a:endCxn id="48" idx="0"/>
+          </p:cNvCxnSpPr>
+          <p:nvPr/>
+        </p:nvCxnSpPr>
+        <p:spPr>
+          <a:xfrm>
+            <a:off x="6285261" y="1954254"/>
+            <a:ext cx="1247040" cy="905074"/>
+          </a:xfrm>
+          <a:prstGeom prst="line">
+            <a:avLst/>
+          </a:prstGeom>
+        </p:spPr>
+        <p:style>
+          <a:lnRef idx="1">
+            <a:schemeClr val="dk1"/>
+          </a:lnRef>
+          <a:fillRef idx="0">
+            <a:schemeClr val="dk1"/>
+          </a:fillRef>
+          <a:effectRef idx="0">
+            <a:schemeClr val="dk1"/>
+          </a:effectRef>
+          <a:fontRef idx="minor">
+            <a:schemeClr val="tx1"/>
+          </a:fontRef>
+        </p:style>
+      </p:cxnSp>
+      <p:sp>
+        <p:nvSpPr>
+          <p:cNvPr id="49" name="타원 48">
+            <a:extLst>
+              <a:ext uri="{FF2B5EF4-FFF2-40B4-BE49-F238E27FC236}">
+                <a16:creationId xmlns:a16="http://schemas.microsoft.com/office/drawing/2014/main" id="{6A77E7DA-3680-42BE-9257-9E7451136604}"/>
+              </a:ext>
+            </a:extLst>
+          </p:cNvPr>
+          <p:cNvSpPr/>
+          <p:nvPr/>
+        </p:nvSpPr>
+        <p:spPr>
+          <a:xfrm>
+            <a:off x="8269937" y="4402381"/>
+            <a:ext cx="908420" cy="814387"/>
+          </a:xfrm>
+          <a:prstGeom prst="ellipse">
+            <a:avLst/>
+          </a:prstGeom>
+          <a:noFill/>
+        </p:spPr>
+        <p:style>
+          <a:lnRef idx="2">
+            <a:schemeClr val="dk1">
+              <a:shade val="50000"/>
+            </a:schemeClr>
+          </a:lnRef>
+          <a:fillRef idx="1">
+            <a:schemeClr val="dk1"/>
+          </a:fillRef>
+          <a:effectRef idx="0">
+            <a:schemeClr val="dk1"/>
+          </a:effectRef>
+          <a:fontRef idx="minor">
+            <a:schemeClr val="lt1"/>
+          </a:fontRef>
+        </p:style>
+        <p:txBody>
+          <a:bodyPr rtlCol="0" anchor="ctr"/>
+          <a:lstStyle/>
+          <a:p>
+            <a:pPr algn="ctr"/>
+            <a:r>
+              <a:rPr lang="en-US" altLang="ko-KR" sz="3200" dirty="0">
+                <a:solidFill>
+                  <a:schemeClr val="tx1"/>
+                </a:solidFill>
+              </a:rPr>
+              <a:t>10</a:t>
+            </a:r>
+            <a:endParaRPr lang="ko-KR" altLang="en-US" sz="3200" dirty="0">
+              <a:solidFill>
+                <a:schemeClr val="tx1"/>
+              </a:solidFill>
+            </a:endParaRPr>
+          </a:p>
+        </p:txBody>
+      </p:sp>
+      <p:cxnSp>
+        <p:nvCxnSpPr>
+          <p:cNvPr id="60" name="직선 연결선 59">
+            <a:extLst>
+              <a:ext uri="{FF2B5EF4-FFF2-40B4-BE49-F238E27FC236}">
+                <a16:creationId xmlns:a16="http://schemas.microsoft.com/office/drawing/2014/main" id="{74125205-87BC-4F44-A4AD-7B48B734FF8D}"/>
+              </a:ext>
+            </a:extLst>
+          </p:cNvPr>
+          <p:cNvCxnSpPr>
+            <a:cxnSpLocks/>
+            <a:stCxn id="48" idx="5"/>
+            <a:endCxn id="49" idx="0"/>
+          </p:cNvCxnSpPr>
+          <p:nvPr/>
+        </p:nvCxnSpPr>
+        <p:spPr>
+          <a:xfrm>
+            <a:off x="7830333" y="3554451"/>
+            <a:ext cx="893814" cy="847930"/>
+          </a:xfrm>
+          <a:prstGeom prst="line">
+            <a:avLst/>
+          </a:prstGeom>
+        </p:spPr>
+        <p:style>
+          <a:lnRef idx="1">
+            <a:schemeClr val="dk1"/>
+          </a:lnRef>
+          <a:fillRef idx="0">
+            <a:schemeClr val="dk1"/>
+          </a:fillRef>
+          <a:effectRef idx="0">
+            <a:schemeClr val="dk1"/>
+          </a:effectRef>
+          <a:fontRef idx="minor">
+            <a:schemeClr val="tx1"/>
+          </a:fontRef>
+        </p:style>
+      </p:cxnSp>
+      <p:sp>
+        <p:nvSpPr>
+          <p:cNvPr id="2" name="TextBox 1">
+            <a:extLst>
+              <a:ext uri="{FF2B5EF4-FFF2-40B4-BE49-F238E27FC236}">
+                <a16:creationId xmlns:a16="http://schemas.microsoft.com/office/drawing/2014/main" id="{F549E1BB-3FB0-4AFF-94EE-3B2562FAF446}"/>
+              </a:ext>
+            </a:extLst>
+          </p:cNvPr>
+          <p:cNvSpPr txBox="1"/>
+          <p:nvPr/>
+        </p:nvSpPr>
+        <p:spPr>
+          <a:xfrm>
+            <a:off x="5656643" y="3978416"/>
+            <a:ext cx="1147270" cy="369332"/>
+          </a:xfrm>
+          <a:prstGeom prst="rect">
+            <a:avLst/>
+          </a:prstGeom>
+          <a:noFill/>
+        </p:spPr>
+        <p:txBody>
+          <a:bodyPr wrap="square" rtlCol="0">
+            <a:spAutoFit/>
+          </a:bodyPr>
+          <a:lstStyle/>
+          <a:p>
+            <a:r>
+              <a:rPr lang="en-US" altLang="ko-KR" dirty="0"/>
+              <a:t>3) 6 &gt; 5</a:t>
+            </a:r>
+            <a:endParaRPr lang="ko-KR" altLang="en-US" dirty="0"/>
+          </a:p>
+        </p:txBody>
+      </p:sp>
+      <p:sp>
+        <p:nvSpPr>
+          <p:cNvPr id="3" name="TextBox 2">
+            <a:extLst>
+              <a:ext uri="{FF2B5EF4-FFF2-40B4-BE49-F238E27FC236}">
+                <a16:creationId xmlns:a16="http://schemas.microsoft.com/office/drawing/2014/main" id="{45662732-21A5-472B-BD8A-10B7E0D08CC2}"/>
+              </a:ext>
+            </a:extLst>
+          </p:cNvPr>
+          <p:cNvSpPr txBox="1"/>
+          <p:nvPr/>
+        </p:nvSpPr>
+        <p:spPr>
+          <a:xfrm>
+            <a:off x="5420529" y="872339"/>
+            <a:ext cx="1042273" cy="369332"/>
+          </a:xfrm>
+          <a:prstGeom prst="rect">
+            <a:avLst/>
+          </a:prstGeom>
+          <a:noFill/>
+        </p:spPr>
+        <p:txBody>
+          <a:bodyPr wrap="none" rtlCol="0">
+            <a:spAutoFit/>
+          </a:bodyPr>
+          <a:lstStyle/>
+          <a:p>
+            <a:r>
+              <a:rPr lang="en-US" altLang="ko-KR" dirty="0"/>
+              <a:t>1) 6 &lt; 7</a:t>
+            </a:r>
+            <a:endParaRPr lang="ko-KR" altLang="en-US" dirty="0"/>
+          </a:p>
+        </p:txBody>
+      </p:sp>
+      <p:sp>
+        <p:nvSpPr>
+          <p:cNvPr id="21" name="TextBox 20">
+            <a:extLst>
+              <a:ext uri="{FF2B5EF4-FFF2-40B4-BE49-F238E27FC236}">
+                <a16:creationId xmlns:a16="http://schemas.microsoft.com/office/drawing/2014/main" id="{59793045-E735-46D6-8ED7-8BA2117626A7}"/>
+              </a:ext>
+            </a:extLst>
+          </p:cNvPr>
+          <p:cNvSpPr txBox="1"/>
+          <p:nvPr/>
+        </p:nvSpPr>
+        <p:spPr>
+          <a:xfrm>
+            <a:off x="3569558" y="2474024"/>
+            <a:ext cx="1042273" cy="369332"/>
+          </a:xfrm>
+          <a:prstGeom prst="rect">
+            <a:avLst/>
+          </a:prstGeom>
+          <a:noFill/>
+        </p:spPr>
+        <p:txBody>
+          <a:bodyPr wrap="none" rtlCol="0">
+            <a:spAutoFit/>
+          </a:bodyPr>
+          <a:lstStyle/>
+          <a:p>
+            <a:r>
+              <a:rPr lang="en-US" altLang="ko-KR" dirty="0"/>
+              <a:t>2) 6 &gt; 3</a:t>
+            </a:r>
+            <a:endParaRPr lang="ko-KR" altLang="en-US" dirty="0"/>
+          </a:p>
+        </p:txBody>
+      </p:sp>
+      <p:sp>
+        <p:nvSpPr>
+          <p:cNvPr id="17" name="타원 16">
+            <a:extLst>
+              <a:ext uri="{FF2B5EF4-FFF2-40B4-BE49-F238E27FC236}">
+                <a16:creationId xmlns:a16="http://schemas.microsoft.com/office/drawing/2014/main" id="{7559FCF6-9603-41DC-B0A1-EB74E94B6201}"/>
+              </a:ext>
+            </a:extLst>
+          </p:cNvPr>
+          <p:cNvSpPr/>
+          <p:nvPr/>
+        </p:nvSpPr>
+        <p:spPr>
+          <a:xfrm>
+            <a:off x="6056328" y="5936246"/>
+            <a:ext cx="842962" cy="814387"/>
+          </a:xfrm>
+          <a:prstGeom prst="ellipse">
+            <a:avLst/>
+          </a:prstGeom>
+          <a:noFill/>
+        </p:spPr>
+        <p:style>
+          <a:lnRef idx="2">
+            <a:schemeClr val="dk1">
+              <a:shade val="50000"/>
+            </a:schemeClr>
+          </a:lnRef>
+          <a:fillRef idx="1">
+            <a:schemeClr val="dk1"/>
+          </a:fillRef>
+          <a:effectRef idx="0">
+            <a:schemeClr val="dk1"/>
+          </a:effectRef>
+          <a:fontRef idx="minor">
+            <a:schemeClr val="lt1"/>
+          </a:fontRef>
+        </p:style>
+        <p:txBody>
+          <a:bodyPr rtlCol="0" anchor="ctr"/>
+          <a:lstStyle/>
+          <a:p>
+            <a:pPr algn="ctr"/>
+            <a:r>
+              <a:rPr lang="en-US" altLang="ko-KR" sz="3200" dirty="0">
+                <a:solidFill>
+                  <a:schemeClr val="tx1"/>
+                </a:solidFill>
+              </a:rPr>
+              <a:t>6</a:t>
+            </a:r>
+            <a:endParaRPr lang="ko-KR" altLang="en-US" sz="3200" dirty="0">
+              <a:solidFill>
+                <a:schemeClr val="tx1"/>
+              </a:solidFill>
+            </a:endParaRPr>
+          </a:p>
+        </p:txBody>
+      </p:sp>
+      <p:cxnSp>
+        <p:nvCxnSpPr>
+          <p:cNvPr id="19" name="직선 연결선 18">
+            <a:extLst>
+              <a:ext uri="{FF2B5EF4-FFF2-40B4-BE49-F238E27FC236}">
+                <a16:creationId xmlns:a16="http://schemas.microsoft.com/office/drawing/2014/main" id="{8DF8C01C-D75F-4725-B223-808353CAC25F}"/>
+              </a:ext>
+            </a:extLst>
+          </p:cNvPr>
+          <p:cNvCxnSpPr>
+            <a:cxnSpLocks/>
+            <a:stCxn id="50" idx="4"/>
+            <a:endCxn id="17" idx="0"/>
+          </p:cNvCxnSpPr>
+          <p:nvPr/>
+        </p:nvCxnSpPr>
+        <p:spPr>
+          <a:xfrm>
+            <a:off x="5648733" y="5216769"/>
+            <a:ext cx="829076" cy="719477"/>
+          </a:xfrm>
+          <a:prstGeom prst="line">
+            <a:avLst/>
+          </a:prstGeom>
+        </p:spPr>
+        <p:style>
+          <a:lnRef idx="1">
+            <a:schemeClr val="dk1"/>
+          </a:lnRef>
+          <a:fillRef idx="0">
+            <a:schemeClr val="dk1"/>
+          </a:fillRef>
+          <a:effectRef idx="0">
+            <a:schemeClr val="dk1"/>
+          </a:effectRef>
+          <a:fontRef idx="minor">
+            <a:schemeClr val="tx1"/>
+          </a:fontRef>
+        </p:style>
+      </p:cxnSp>
+      <p:sp>
+        <p:nvSpPr>
+          <p:cNvPr id="22" name="TextBox 21">
+            <a:extLst>
+              <a:ext uri="{FF2B5EF4-FFF2-40B4-BE49-F238E27FC236}">
+                <a16:creationId xmlns:a16="http://schemas.microsoft.com/office/drawing/2014/main" id="{2C0CEF7A-5F5C-40B6-B600-B71129EA4D1A}"/>
+              </a:ext>
+            </a:extLst>
+          </p:cNvPr>
+          <p:cNvSpPr txBox="1"/>
+          <p:nvPr/>
+        </p:nvSpPr>
+        <p:spPr>
+          <a:xfrm>
+            <a:off x="6418689" y="5566914"/>
+            <a:ext cx="1147270" cy="369332"/>
+          </a:xfrm>
+          <a:prstGeom prst="rect">
+            <a:avLst/>
+          </a:prstGeom>
+          <a:noFill/>
+        </p:spPr>
+        <p:txBody>
+          <a:bodyPr wrap="square" rtlCol="0">
+            <a:spAutoFit/>
+          </a:bodyPr>
+          <a:lstStyle/>
+          <a:p>
+            <a:r>
+              <a:rPr lang="en-US" altLang="ko-KR" dirty="0"/>
+              <a:t>4) 6 = 6</a:t>
+            </a:r>
+            <a:endParaRPr lang="ko-KR" altLang="en-US" dirty="0"/>
+          </a:p>
+        </p:txBody>
+      </p:sp>
+    </p:spTree>
+    <p:extLst>
+      <p:ext uri="{BB962C8B-B14F-4D97-AF65-F5344CB8AC3E}">
+        <p14:creationId xmlns:p14="http://schemas.microsoft.com/office/powerpoint/2010/main" val="1653464796"/>
+      </p:ext>
+    </p:extLst>
+  </p:cSld>
+  <p:clrMapOvr>
+    <a:masterClrMapping/>
+  </p:clrMapOvr>
+</p:sld>
+</file>
+
+<file path=ppt/slides/slide4.xml><?xml version="1.0" encoding="utf-8"?>
+<p:sld xmlns:a="http://schemas.openxmlformats.org/drawingml/2006/main" xmlns:r="http://schemas.openxmlformats.org/officeDocument/2006/relationships" xmlns:p="http://schemas.openxmlformats.org/presentationml/2006/main">
+  <p:cSld>
+    <p:spTree>
+      <p:nvGrpSpPr>
+        <p:cNvPr id="1" name=""/>
+        <p:cNvGrpSpPr/>
+        <p:nvPr/>
+      </p:nvGrpSpPr>
+      <p:grpSpPr>
+        <a:xfrm>
+          <a:off x="0" y="0"/>
+          <a:ext cx="0" cy="0"/>
+          <a:chOff x="0" y="0"/>
+          <a:chExt cx="0" cy="0"/>
+        </a:xfrm>
+      </p:grpSpPr>
+      <p:sp>
+        <p:nvSpPr>
+          <p:cNvPr id="42" name="타원 41">
+            <a:extLst>
+              <a:ext uri="{FF2B5EF4-FFF2-40B4-BE49-F238E27FC236}">
+                <a16:creationId xmlns:a16="http://schemas.microsoft.com/office/drawing/2014/main" id="{92ABCDEC-250B-40C0-8812-8B9257F6B78D}"/>
+              </a:ext>
+            </a:extLst>
+          </p:cNvPr>
+          <p:cNvSpPr/>
+          <p:nvPr/>
+        </p:nvSpPr>
+        <p:spPr>
+          <a:xfrm>
+            <a:off x="5565748" y="1259131"/>
+            <a:ext cx="842962" cy="814387"/>
+          </a:xfrm>
+          <a:prstGeom prst="ellipse">
+            <a:avLst/>
+          </a:prstGeom>
+          <a:noFill/>
+        </p:spPr>
+        <p:style>
+          <a:lnRef idx="2">
+            <a:schemeClr val="dk1">
+              <a:shade val="50000"/>
+            </a:schemeClr>
+          </a:lnRef>
+          <a:fillRef idx="1">
+            <a:schemeClr val="dk1"/>
+          </a:fillRef>
+          <a:effectRef idx="0">
+            <a:schemeClr val="dk1"/>
+          </a:effectRef>
+          <a:fontRef idx="minor">
+            <a:schemeClr val="lt1"/>
+          </a:fontRef>
+        </p:style>
+        <p:txBody>
+          <a:bodyPr rtlCol="0" anchor="ctr"/>
+          <a:lstStyle/>
+          <a:p>
+            <a:pPr algn="ctr"/>
+            <a:r>
+              <a:rPr lang="en-US" altLang="ko-KR" sz="3200" dirty="0">
+                <a:solidFill>
+                  <a:schemeClr val="tx1"/>
+                </a:solidFill>
+              </a:rPr>
+              <a:t>7</a:t>
+            </a:r>
+            <a:endParaRPr lang="ko-KR" altLang="en-US" sz="3200" dirty="0">
+              <a:solidFill>
+                <a:schemeClr val="tx1"/>
+              </a:solidFill>
+            </a:endParaRPr>
+          </a:p>
+        </p:txBody>
+      </p:sp>
+      <p:sp>
+        <p:nvSpPr>
+          <p:cNvPr id="47" name="타원 46">
+            <a:extLst>
+              <a:ext uri="{FF2B5EF4-FFF2-40B4-BE49-F238E27FC236}">
+                <a16:creationId xmlns:a16="http://schemas.microsoft.com/office/drawing/2014/main" id="{91893471-6591-4ACE-B7FD-2FE3D7EBE3A9}"/>
+              </a:ext>
+            </a:extLst>
+          </p:cNvPr>
+          <p:cNvSpPr/>
+          <p:nvPr/>
+        </p:nvSpPr>
+        <p:spPr>
+          <a:xfrm>
+            <a:off x="4120446" y="2859328"/>
+            <a:ext cx="842962" cy="814387"/>
+          </a:xfrm>
+          <a:prstGeom prst="ellipse">
+            <a:avLst/>
+          </a:prstGeom>
+          <a:noFill/>
+        </p:spPr>
+        <p:style>
+          <a:lnRef idx="2">
+            <a:schemeClr val="dk1">
+              <a:shade val="50000"/>
+            </a:schemeClr>
+          </a:lnRef>
+          <a:fillRef idx="1">
+            <a:schemeClr val="dk1"/>
+          </a:fillRef>
+          <a:effectRef idx="0">
+            <a:schemeClr val="dk1"/>
+          </a:effectRef>
+          <a:fontRef idx="minor">
+            <a:schemeClr val="lt1"/>
+          </a:fontRef>
+        </p:style>
+        <p:txBody>
+          <a:bodyPr rtlCol="0" anchor="ctr"/>
+          <a:lstStyle/>
+          <a:p>
+            <a:pPr algn="ctr"/>
+            <a:r>
+              <a:rPr lang="en-US" altLang="ko-KR" sz="3200" dirty="0">
+                <a:solidFill>
+                  <a:schemeClr val="tx1"/>
+                </a:solidFill>
+              </a:rPr>
+              <a:t>3</a:t>
+            </a:r>
+            <a:endParaRPr lang="ko-KR" altLang="en-US" sz="3200" dirty="0">
+              <a:solidFill>
+                <a:schemeClr val="tx1"/>
+              </a:solidFill>
+            </a:endParaRPr>
+          </a:p>
+        </p:txBody>
+      </p:sp>
+      <p:sp>
+        <p:nvSpPr>
+          <p:cNvPr id="48" name="타원 47">
+            <a:extLst>
+              <a:ext uri="{FF2B5EF4-FFF2-40B4-BE49-F238E27FC236}">
+                <a16:creationId xmlns:a16="http://schemas.microsoft.com/office/drawing/2014/main" id="{75833488-1488-4FC6-9393-C43992CEFD09}"/>
+              </a:ext>
+            </a:extLst>
+          </p:cNvPr>
+          <p:cNvSpPr/>
+          <p:nvPr/>
+        </p:nvSpPr>
+        <p:spPr>
+          <a:xfrm>
+            <a:off x="7110820" y="2859328"/>
+            <a:ext cx="842962" cy="814387"/>
+          </a:xfrm>
+          <a:prstGeom prst="ellipse">
+            <a:avLst/>
+          </a:prstGeom>
+          <a:noFill/>
+        </p:spPr>
+        <p:style>
+          <a:lnRef idx="2">
+            <a:schemeClr val="dk1">
+              <a:shade val="50000"/>
+            </a:schemeClr>
+          </a:lnRef>
+          <a:fillRef idx="1">
+            <a:schemeClr val="dk1"/>
+          </a:fillRef>
+          <a:effectRef idx="0">
+            <a:schemeClr val="dk1"/>
+          </a:effectRef>
+          <a:fontRef idx="minor">
+            <a:schemeClr val="lt1"/>
+          </a:fontRef>
+        </p:style>
+        <p:txBody>
+          <a:bodyPr rtlCol="0" anchor="ctr"/>
+          <a:lstStyle/>
+          <a:p>
+            <a:pPr algn="ctr"/>
+            <a:r>
+              <a:rPr lang="en-US" altLang="ko-KR" sz="3200" dirty="0">
+                <a:solidFill>
+                  <a:schemeClr val="tx1"/>
+                </a:solidFill>
+              </a:rPr>
+              <a:t>8</a:t>
+            </a:r>
+            <a:endParaRPr lang="ko-KR" altLang="en-US" sz="3200" dirty="0">
+              <a:solidFill>
+                <a:schemeClr val="tx1"/>
+              </a:solidFill>
+            </a:endParaRPr>
+          </a:p>
+        </p:txBody>
+      </p:sp>
+      <p:sp>
+        <p:nvSpPr>
+          <p:cNvPr id="50" name="타원 49">
+            <a:extLst>
+              <a:ext uri="{FF2B5EF4-FFF2-40B4-BE49-F238E27FC236}">
+                <a16:creationId xmlns:a16="http://schemas.microsoft.com/office/drawing/2014/main" id="{88AB90D7-60C5-42FD-B488-DB1174256B19}"/>
+              </a:ext>
+            </a:extLst>
+          </p:cNvPr>
+          <p:cNvSpPr/>
+          <p:nvPr/>
+        </p:nvSpPr>
+        <p:spPr>
+          <a:xfrm>
+            <a:off x="5227252" y="4402382"/>
+            <a:ext cx="842962" cy="814387"/>
+          </a:xfrm>
+          <a:prstGeom prst="ellipse">
+            <a:avLst/>
+          </a:prstGeom>
+          <a:noFill/>
+        </p:spPr>
+        <p:style>
+          <a:lnRef idx="2">
+            <a:schemeClr val="dk1">
+              <a:shade val="50000"/>
+            </a:schemeClr>
+          </a:lnRef>
+          <a:fillRef idx="1">
+            <a:schemeClr val="dk1"/>
+          </a:fillRef>
+          <a:effectRef idx="0">
+            <a:schemeClr val="dk1"/>
+          </a:effectRef>
+          <a:fontRef idx="minor">
+            <a:schemeClr val="lt1"/>
+          </a:fontRef>
+        </p:style>
+        <p:txBody>
+          <a:bodyPr rtlCol="0" anchor="ctr"/>
+          <a:lstStyle/>
+          <a:p>
+            <a:pPr algn="ctr"/>
+            <a:r>
+              <a:rPr lang="en-US" altLang="ko-KR" sz="3200" dirty="0">
+                <a:solidFill>
+                  <a:schemeClr val="tx1"/>
+                </a:solidFill>
+              </a:rPr>
+              <a:t>5</a:t>
+            </a:r>
+            <a:endParaRPr lang="ko-KR" altLang="en-US" sz="3200" dirty="0">
+              <a:solidFill>
+                <a:schemeClr val="tx1"/>
+              </a:solidFill>
+            </a:endParaRPr>
+          </a:p>
+        </p:txBody>
+      </p:sp>
+      <p:sp>
+        <p:nvSpPr>
+          <p:cNvPr id="51" name="타원 50">
+            <a:extLst>
+              <a:ext uri="{FF2B5EF4-FFF2-40B4-BE49-F238E27FC236}">
+                <a16:creationId xmlns:a16="http://schemas.microsoft.com/office/drawing/2014/main" id="{76613553-D7D1-454D-A29D-7E72623E935E}"/>
+              </a:ext>
+            </a:extLst>
+          </p:cNvPr>
+          <p:cNvSpPr/>
+          <p:nvPr/>
+        </p:nvSpPr>
+        <p:spPr>
+          <a:xfrm>
+            <a:off x="3013643" y="4402382"/>
+            <a:ext cx="842962" cy="814387"/>
+          </a:xfrm>
+          <a:prstGeom prst="ellipse">
+            <a:avLst/>
+          </a:prstGeom>
+          <a:noFill/>
+        </p:spPr>
+        <p:style>
+          <a:lnRef idx="2">
+            <a:schemeClr val="dk1">
+              <a:shade val="50000"/>
+            </a:schemeClr>
+          </a:lnRef>
+          <a:fillRef idx="1">
+            <a:schemeClr val="dk1"/>
+          </a:fillRef>
+          <a:effectRef idx="0">
+            <a:schemeClr val="dk1"/>
+          </a:effectRef>
+          <a:fontRef idx="minor">
+            <a:schemeClr val="lt1"/>
+          </a:fontRef>
+        </p:style>
+        <p:txBody>
+          <a:bodyPr rtlCol="0" anchor="ctr"/>
+          <a:lstStyle/>
+          <a:p>
+            <a:pPr algn="ctr"/>
+            <a:r>
+              <a:rPr lang="en-US" altLang="ko-KR" sz="3200" dirty="0">
+                <a:solidFill>
+                  <a:schemeClr val="tx1"/>
+                </a:solidFill>
+              </a:rPr>
+              <a:t>1</a:t>
+            </a:r>
+            <a:endParaRPr lang="ko-KR" altLang="en-US" sz="3200" dirty="0">
+              <a:solidFill>
+                <a:schemeClr val="tx1"/>
+              </a:solidFill>
+            </a:endParaRPr>
+          </a:p>
+        </p:txBody>
+      </p:sp>
+      <p:cxnSp>
+        <p:nvCxnSpPr>
+          <p:cNvPr id="16" name="직선 연결선 15">
+            <a:extLst>
+              <a:ext uri="{FF2B5EF4-FFF2-40B4-BE49-F238E27FC236}">
+                <a16:creationId xmlns:a16="http://schemas.microsoft.com/office/drawing/2014/main" id="{A5DC94D9-2D54-4AFF-96DD-C4484055E7A6}"/>
+              </a:ext>
+            </a:extLst>
+          </p:cNvPr>
+          <p:cNvCxnSpPr>
+            <a:stCxn id="42" idx="3"/>
+            <a:endCxn id="47" idx="0"/>
+          </p:cNvCxnSpPr>
+          <p:nvPr/>
+        </p:nvCxnSpPr>
+        <p:spPr>
+          <a:xfrm flipH="1">
+            <a:off x="4541927" y="1954254"/>
+            <a:ext cx="1147270" cy="905074"/>
+          </a:xfrm>
+          <a:prstGeom prst="line">
+            <a:avLst/>
+          </a:prstGeom>
+        </p:spPr>
+        <p:style>
+          <a:lnRef idx="1">
+            <a:schemeClr val="dk1"/>
+          </a:lnRef>
+          <a:fillRef idx="0">
+            <a:schemeClr val="dk1"/>
+          </a:fillRef>
+          <a:effectRef idx="0">
+            <a:schemeClr val="dk1"/>
+          </a:effectRef>
+          <a:fontRef idx="minor">
+            <a:schemeClr val="tx1"/>
+          </a:fontRef>
+        </p:style>
+      </p:cxnSp>
+      <p:cxnSp>
+        <p:nvCxnSpPr>
+          <p:cNvPr id="18" name="직선 연결선 17">
+            <a:extLst>
+              <a:ext uri="{FF2B5EF4-FFF2-40B4-BE49-F238E27FC236}">
+                <a16:creationId xmlns:a16="http://schemas.microsoft.com/office/drawing/2014/main" id="{7F131259-FAE2-4864-8844-285D43D73BBB}"/>
+              </a:ext>
+            </a:extLst>
+          </p:cNvPr>
+          <p:cNvCxnSpPr>
+            <a:stCxn id="47" idx="3"/>
+            <a:endCxn id="51" idx="0"/>
+          </p:cNvCxnSpPr>
+          <p:nvPr/>
+        </p:nvCxnSpPr>
+        <p:spPr>
+          <a:xfrm flipH="1">
+            <a:off x="3435124" y="3554451"/>
+            <a:ext cx="808771" cy="847931"/>
+          </a:xfrm>
+          <a:prstGeom prst="line">
+            <a:avLst/>
+          </a:prstGeom>
+        </p:spPr>
+        <p:style>
+          <a:lnRef idx="1">
+            <a:schemeClr val="dk1"/>
+          </a:lnRef>
+          <a:fillRef idx="0">
+            <a:schemeClr val="dk1"/>
+          </a:fillRef>
+          <a:effectRef idx="0">
+            <a:schemeClr val="dk1"/>
+          </a:effectRef>
+          <a:fontRef idx="minor">
+            <a:schemeClr val="tx1"/>
+          </a:fontRef>
+        </p:style>
+      </p:cxnSp>
+      <p:cxnSp>
+        <p:nvCxnSpPr>
+          <p:cNvPr id="20" name="직선 연결선 19">
+            <a:extLst>
+              <a:ext uri="{FF2B5EF4-FFF2-40B4-BE49-F238E27FC236}">
+                <a16:creationId xmlns:a16="http://schemas.microsoft.com/office/drawing/2014/main" id="{0B8E17D1-D681-4B9F-836B-B5D5C002EB81}"/>
+              </a:ext>
+            </a:extLst>
+          </p:cNvPr>
+          <p:cNvCxnSpPr>
+            <a:stCxn id="47" idx="5"/>
+            <a:endCxn id="50" idx="0"/>
+          </p:cNvCxnSpPr>
+          <p:nvPr/>
+        </p:nvCxnSpPr>
+        <p:spPr>
+          <a:xfrm>
+            <a:off x="4839959" y="3554451"/>
+            <a:ext cx="808774" cy="847931"/>
+          </a:xfrm>
+          <a:prstGeom prst="line">
+            <a:avLst/>
+          </a:prstGeom>
+        </p:spPr>
+        <p:style>
+          <a:lnRef idx="1">
+            <a:schemeClr val="dk1"/>
+          </a:lnRef>
+          <a:fillRef idx="0">
+            <a:schemeClr val="dk1"/>
+          </a:fillRef>
+          <a:effectRef idx="0">
+            <a:schemeClr val="dk1"/>
+          </a:effectRef>
+          <a:fontRef idx="minor">
+            <a:schemeClr val="tx1"/>
+          </a:fontRef>
+        </p:style>
+      </p:cxnSp>
+      <p:cxnSp>
+        <p:nvCxnSpPr>
+          <p:cNvPr id="29" name="직선 연결선 28">
+            <a:extLst>
+              <a:ext uri="{FF2B5EF4-FFF2-40B4-BE49-F238E27FC236}">
+                <a16:creationId xmlns:a16="http://schemas.microsoft.com/office/drawing/2014/main" id="{BC052159-12D0-4300-8B07-890AF53A1396}"/>
+              </a:ext>
+            </a:extLst>
+          </p:cNvPr>
+          <p:cNvCxnSpPr>
+            <a:stCxn id="42" idx="5"/>
+            <a:endCxn id="48" idx="0"/>
+          </p:cNvCxnSpPr>
+          <p:nvPr/>
+        </p:nvCxnSpPr>
+        <p:spPr>
+          <a:xfrm>
+            <a:off x="6285261" y="1954254"/>
+            <a:ext cx="1247040" cy="905074"/>
+          </a:xfrm>
+          <a:prstGeom prst="line">
+            <a:avLst/>
+          </a:prstGeom>
+        </p:spPr>
+        <p:style>
+          <a:lnRef idx="1">
+            <a:schemeClr val="dk1"/>
+          </a:lnRef>
+          <a:fillRef idx="0">
+            <a:schemeClr val="dk1"/>
+          </a:fillRef>
+          <a:effectRef idx="0">
+            <a:schemeClr val="dk1"/>
+          </a:effectRef>
+          <a:fontRef idx="minor">
+            <a:schemeClr val="tx1"/>
+          </a:fontRef>
+        </p:style>
+      </p:cxnSp>
+      <p:sp>
+        <p:nvSpPr>
+          <p:cNvPr id="49" name="타원 48">
+            <a:extLst>
+              <a:ext uri="{FF2B5EF4-FFF2-40B4-BE49-F238E27FC236}">
+                <a16:creationId xmlns:a16="http://schemas.microsoft.com/office/drawing/2014/main" id="{6A77E7DA-3680-42BE-9257-9E7451136604}"/>
+              </a:ext>
+            </a:extLst>
+          </p:cNvPr>
+          <p:cNvSpPr/>
+          <p:nvPr/>
+        </p:nvSpPr>
+        <p:spPr>
+          <a:xfrm>
+            <a:off x="8269937" y="4402381"/>
+            <a:ext cx="908420" cy="814387"/>
+          </a:xfrm>
+          <a:prstGeom prst="ellipse">
+            <a:avLst/>
+          </a:prstGeom>
+          <a:noFill/>
+        </p:spPr>
+        <p:style>
+          <a:lnRef idx="2">
+            <a:schemeClr val="dk1">
+              <a:shade val="50000"/>
+            </a:schemeClr>
+          </a:lnRef>
+          <a:fillRef idx="1">
+            <a:schemeClr val="dk1"/>
+          </a:fillRef>
+          <a:effectRef idx="0">
+            <a:schemeClr val="dk1"/>
+          </a:effectRef>
+          <a:fontRef idx="minor">
+            <a:schemeClr val="lt1"/>
+          </a:fontRef>
+        </p:style>
+        <p:txBody>
+          <a:bodyPr rtlCol="0" anchor="ctr"/>
+          <a:lstStyle/>
+          <a:p>
+            <a:pPr algn="ctr"/>
+            <a:r>
+              <a:rPr lang="en-US" altLang="ko-KR" sz="3200" dirty="0">
+                <a:solidFill>
+                  <a:schemeClr val="tx1"/>
+                </a:solidFill>
+              </a:rPr>
+              <a:t>10</a:t>
+            </a:r>
+            <a:endParaRPr lang="ko-KR" altLang="en-US" sz="3200" dirty="0">
+              <a:solidFill>
+                <a:schemeClr val="tx1"/>
+              </a:solidFill>
+            </a:endParaRPr>
+          </a:p>
+        </p:txBody>
+      </p:sp>
+      <p:cxnSp>
+        <p:nvCxnSpPr>
+          <p:cNvPr id="60" name="직선 연결선 59">
+            <a:extLst>
+              <a:ext uri="{FF2B5EF4-FFF2-40B4-BE49-F238E27FC236}">
+                <a16:creationId xmlns:a16="http://schemas.microsoft.com/office/drawing/2014/main" id="{74125205-87BC-4F44-A4AD-7B48B734FF8D}"/>
+              </a:ext>
+            </a:extLst>
+          </p:cNvPr>
+          <p:cNvCxnSpPr>
+            <a:cxnSpLocks/>
+            <a:stCxn id="48" idx="5"/>
+            <a:endCxn id="49" idx="0"/>
+          </p:cNvCxnSpPr>
+          <p:nvPr/>
+        </p:nvCxnSpPr>
+        <p:spPr>
+          <a:xfrm>
+            <a:off x="7830333" y="3554451"/>
+            <a:ext cx="893814" cy="847930"/>
+          </a:xfrm>
+          <a:prstGeom prst="line">
+            <a:avLst/>
+          </a:prstGeom>
+        </p:spPr>
+        <p:style>
+          <a:lnRef idx="1">
+            <a:schemeClr val="dk1"/>
+          </a:lnRef>
+          <a:fillRef idx="0">
+            <a:schemeClr val="dk1"/>
+          </a:fillRef>
+          <a:effectRef idx="0">
+            <a:schemeClr val="dk1"/>
+          </a:effectRef>
+          <a:fontRef idx="minor">
+            <a:schemeClr val="tx1"/>
+          </a:fontRef>
+        </p:style>
+      </p:cxnSp>
+      <p:sp>
+        <p:nvSpPr>
+          <p:cNvPr id="3" name="TextBox 2">
+            <a:extLst>
+              <a:ext uri="{FF2B5EF4-FFF2-40B4-BE49-F238E27FC236}">
+                <a16:creationId xmlns:a16="http://schemas.microsoft.com/office/drawing/2014/main" id="{45662732-21A5-472B-BD8A-10B7E0D08CC2}"/>
+              </a:ext>
+            </a:extLst>
+          </p:cNvPr>
+          <p:cNvSpPr txBox="1"/>
+          <p:nvPr/>
+        </p:nvSpPr>
+        <p:spPr>
+          <a:xfrm>
+            <a:off x="5420529" y="872339"/>
+            <a:ext cx="1042273" cy="369332"/>
+          </a:xfrm>
+          <a:prstGeom prst="rect">
+            <a:avLst/>
+          </a:prstGeom>
+          <a:noFill/>
+        </p:spPr>
+        <p:txBody>
+          <a:bodyPr wrap="none" rtlCol="0">
+            <a:spAutoFit/>
+          </a:bodyPr>
+          <a:lstStyle/>
+          <a:p>
+            <a:r>
+              <a:rPr lang="en-US" altLang="ko-KR" dirty="0"/>
+              <a:t>1) 8 &gt; 7</a:t>
+            </a:r>
+            <a:endParaRPr lang="ko-KR" altLang="en-US" dirty="0"/>
+          </a:p>
+        </p:txBody>
+      </p:sp>
+      <p:sp>
+        <p:nvSpPr>
+          <p:cNvPr id="22" name="TextBox 21">
+            <a:extLst>
+              <a:ext uri="{FF2B5EF4-FFF2-40B4-BE49-F238E27FC236}">
+                <a16:creationId xmlns:a16="http://schemas.microsoft.com/office/drawing/2014/main" id="{4EFF4A73-8DD9-4382-ACE6-447E42CCD179}"/>
+              </a:ext>
+            </a:extLst>
+          </p:cNvPr>
+          <p:cNvSpPr txBox="1"/>
+          <p:nvPr/>
+        </p:nvSpPr>
+        <p:spPr>
+          <a:xfrm>
+            <a:off x="7432645" y="2489996"/>
+            <a:ext cx="1042273" cy="369332"/>
+          </a:xfrm>
+          <a:prstGeom prst="rect">
+            <a:avLst/>
+          </a:prstGeom>
+          <a:noFill/>
+        </p:spPr>
+        <p:txBody>
+          <a:bodyPr wrap="none" rtlCol="0">
+            <a:spAutoFit/>
+          </a:bodyPr>
+          <a:lstStyle/>
+          <a:p>
+            <a:r>
+              <a:rPr lang="en-US" altLang="ko-KR" dirty="0"/>
+              <a:t>2) 8 = 8</a:t>
+            </a:r>
+            <a:endParaRPr lang="ko-KR" altLang="en-US" dirty="0"/>
+          </a:p>
+        </p:txBody>
+      </p:sp>
+    </p:spTree>
+    <p:extLst>
+      <p:ext uri="{BB962C8B-B14F-4D97-AF65-F5344CB8AC3E}">
+        <p14:creationId xmlns:p14="http://schemas.microsoft.com/office/powerpoint/2010/main" val="3728460436"/>
+      </p:ext>
+    </p:extLst>
+  </p:cSld>
+  <p:clrMapOvr>
+    <a:masterClrMapping/>
+  </p:clrMapOvr>
+</p:sld>
+</file>
+
+<file path=ppt/slides/slide5.xml><?xml version="1.0" encoding="utf-8"?>
+<p:sld xmlns:a="http://schemas.openxmlformats.org/drawingml/2006/main" xmlns:r="http://schemas.openxmlformats.org/officeDocument/2006/relationships" xmlns:p="http://schemas.openxmlformats.org/presentationml/2006/main">
+  <p:cSld>
+    <p:spTree>
+      <p:nvGrpSpPr>
+        <p:cNvPr id="1" name=""/>
+        <p:cNvGrpSpPr/>
+        <p:nvPr/>
+      </p:nvGrpSpPr>
+      <p:grpSpPr>
+        <a:xfrm>
+          <a:off x="0" y="0"/>
+          <a:ext cx="0" cy="0"/>
+          <a:chOff x="0" y="0"/>
+          <a:chExt cx="0" cy="0"/>
+        </a:xfrm>
+      </p:grpSpPr>
+      <p:sp>
+        <p:nvSpPr>
+          <p:cNvPr id="42" name="타원 41">
+            <a:extLst>
+              <a:ext uri="{FF2B5EF4-FFF2-40B4-BE49-F238E27FC236}">
+                <a16:creationId xmlns:a16="http://schemas.microsoft.com/office/drawing/2014/main" id="{92ABCDEC-250B-40C0-8812-8B9257F6B78D}"/>
+              </a:ext>
+            </a:extLst>
+          </p:cNvPr>
+          <p:cNvSpPr/>
+          <p:nvPr/>
+        </p:nvSpPr>
+        <p:spPr>
+          <a:xfrm>
+            <a:off x="5565748" y="1259131"/>
+            <a:ext cx="842962" cy="814387"/>
+          </a:xfrm>
+          <a:prstGeom prst="ellipse">
+            <a:avLst/>
+          </a:prstGeom>
+          <a:noFill/>
+        </p:spPr>
+        <p:style>
+          <a:lnRef idx="2">
+            <a:schemeClr val="dk1">
+              <a:shade val="50000"/>
+            </a:schemeClr>
+          </a:lnRef>
+          <a:fillRef idx="1">
+            <a:schemeClr val="dk1"/>
+          </a:fillRef>
+          <a:effectRef idx="0">
+            <a:schemeClr val="dk1"/>
+          </a:effectRef>
+          <a:fontRef idx="minor">
+            <a:schemeClr val="lt1"/>
+          </a:fontRef>
+        </p:style>
+        <p:txBody>
+          <a:bodyPr rtlCol="0" anchor="ctr"/>
+          <a:lstStyle/>
+          <a:p>
+            <a:pPr algn="ctr"/>
+            <a:r>
+              <a:rPr lang="en-US" altLang="ko-KR" sz="3200" dirty="0">
+                <a:solidFill>
+                  <a:schemeClr val="tx1"/>
+                </a:solidFill>
+              </a:rPr>
+              <a:t>7</a:t>
+            </a:r>
+            <a:endParaRPr lang="ko-KR" altLang="en-US" sz="3200" dirty="0">
+              <a:solidFill>
+                <a:schemeClr val="tx1"/>
+              </a:solidFill>
+            </a:endParaRPr>
+          </a:p>
+        </p:txBody>
+      </p:sp>
+      <p:sp>
+        <p:nvSpPr>
+          <p:cNvPr id="47" name="타원 46">
+            <a:extLst>
+              <a:ext uri="{FF2B5EF4-FFF2-40B4-BE49-F238E27FC236}">
+                <a16:creationId xmlns:a16="http://schemas.microsoft.com/office/drawing/2014/main" id="{91893471-6591-4ACE-B7FD-2FE3D7EBE3A9}"/>
+              </a:ext>
+            </a:extLst>
+          </p:cNvPr>
+          <p:cNvSpPr/>
+          <p:nvPr/>
+        </p:nvSpPr>
+        <p:spPr>
+          <a:xfrm>
+            <a:off x="4120446" y="2859328"/>
+            <a:ext cx="842962" cy="814387"/>
+          </a:xfrm>
+          <a:prstGeom prst="ellipse">
+            <a:avLst/>
+          </a:prstGeom>
+          <a:noFill/>
+        </p:spPr>
+        <p:style>
+          <a:lnRef idx="2">
+            <a:schemeClr val="dk1">
+              <a:shade val="50000"/>
+            </a:schemeClr>
+          </a:lnRef>
+          <a:fillRef idx="1">
+            <a:schemeClr val="dk1"/>
+          </a:fillRef>
+          <a:effectRef idx="0">
+            <a:schemeClr val="dk1"/>
+          </a:effectRef>
+          <a:fontRef idx="minor">
+            <a:schemeClr val="lt1"/>
+          </a:fontRef>
+        </p:style>
+        <p:txBody>
+          <a:bodyPr rtlCol="0" anchor="ctr"/>
+          <a:lstStyle/>
+          <a:p>
+            <a:pPr algn="ctr"/>
+            <a:r>
+              <a:rPr lang="en-US" altLang="ko-KR" sz="3200" dirty="0">
+                <a:solidFill>
+                  <a:schemeClr val="tx1"/>
+                </a:solidFill>
+              </a:rPr>
+              <a:t>3</a:t>
+            </a:r>
+            <a:endParaRPr lang="ko-KR" altLang="en-US" sz="3200" dirty="0">
+              <a:solidFill>
+                <a:schemeClr val="tx1"/>
+              </a:solidFill>
+            </a:endParaRPr>
+          </a:p>
+        </p:txBody>
+      </p:sp>
+      <p:sp>
+        <p:nvSpPr>
+          <p:cNvPr id="48" name="타원 47">
+            <a:extLst>
+              <a:ext uri="{FF2B5EF4-FFF2-40B4-BE49-F238E27FC236}">
+                <a16:creationId xmlns:a16="http://schemas.microsoft.com/office/drawing/2014/main" id="{75833488-1488-4FC6-9393-C43992CEFD09}"/>
+              </a:ext>
+            </a:extLst>
+          </p:cNvPr>
+          <p:cNvSpPr/>
+          <p:nvPr/>
+        </p:nvSpPr>
+        <p:spPr>
+          <a:xfrm>
+            <a:off x="7110820" y="2859328"/>
+            <a:ext cx="924816" cy="814387"/>
+          </a:xfrm>
+          <a:prstGeom prst="ellipse">
+            <a:avLst/>
+          </a:prstGeom>
+          <a:noFill/>
+        </p:spPr>
+        <p:style>
+          <a:lnRef idx="2">
+            <a:schemeClr val="dk1">
+              <a:shade val="50000"/>
+            </a:schemeClr>
+          </a:lnRef>
+          <a:fillRef idx="1">
+            <a:schemeClr val="dk1"/>
+          </a:fillRef>
+          <a:effectRef idx="0">
+            <a:schemeClr val="dk1"/>
+          </a:effectRef>
+          <a:fontRef idx="minor">
+            <a:schemeClr val="lt1"/>
+          </a:fontRef>
+        </p:style>
+        <p:txBody>
+          <a:bodyPr rtlCol="0" anchor="ctr"/>
+          <a:lstStyle/>
+          <a:p>
+            <a:pPr algn="ctr"/>
+            <a:r>
+              <a:rPr lang="en-US" altLang="ko-KR" sz="3200" dirty="0">
+                <a:solidFill>
+                  <a:schemeClr val="tx1"/>
+                </a:solidFill>
+              </a:rPr>
+              <a:t>10</a:t>
+            </a:r>
+            <a:endParaRPr lang="ko-KR" altLang="en-US" sz="3200" dirty="0">
+              <a:solidFill>
+                <a:schemeClr val="tx1"/>
+              </a:solidFill>
+            </a:endParaRPr>
+          </a:p>
+        </p:txBody>
+      </p:sp>
+      <p:sp>
+        <p:nvSpPr>
+          <p:cNvPr id="50" name="타원 49">
+            <a:extLst>
+              <a:ext uri="{FF2B5EF4-FFF2-40B4-BE49-F238E27FC236}">
+                <a16:creationId xmlns:a16="http://schemas.microsoft.com/office/drawing/2014/main" id="{88AB90D7-60C5-42FD-B488-DB1174256B19}"/>
+              </a:ext>
+            </a:extLst>
+          </p:cNvPr>
+          <p:cNvSpPr/>
+          <p:nvPr/>
+        </p:nvSpPr>
+        <p:spPr>
+          <a:xfrm>
+            <a:off x="5227252" y="4402382"/>
+            <a:ext cx="842962" cy="814387"/>
+          </a:xfrm>
+          <a:prstGeom prst="ellipse">
+            <a:avLst/>
+          </a:prstGeom>
+          <a:noFill/>
+        </p:spPr>
+        <p:style>
+          <a:lnRef idx="2">
+            <a:schemeClr val="dk1">
+              <a:shade val="50000"/>
+            </a:schemeClr>
+          </a:lnRef>
+          <a:fillRef idx="1">
+            <a:schemeClr val="dk1"/>
+          </a:fillRef>
+          <a:effectRef idx="0">
+            <a:schemeClr val="dk1"/>
+          </a:effectRef>
+          <a:fontRef idx="minor">
+            <a:schemeClr val="lt1"/>
+          </a:fontRef>
+        </p:style>
+        <p:txBody>
+          <a:bodyPr rtlCol="0" anchor="ctr"/>
+          <a:lstStyle/>
+          <a:p>
+            <a:pPr algn="ctr"/>
+            <a:r>
+              <a:rPr lang="en-US" altLang="ko-KR" sz="3200" dirty="0">
+                <a:solidFill>
+                  <a:schemeClr val="tx1"/>
+                </a:solidFill>
+              </a:rPr>
+              <a:t>5</a:t>
+            </a:r>
+            <a:endParaRPr lang="ko-KR" altLang="en-US" sz="3200" dirty="0">
+              <a:solidFill>
+                <a:schemeClr val="tx1"/>
+              </a:solidFill>
+            </a:endParaRPr>
+          </a:p>
+        </p:txBody>
+      </p:sp>
+      <p:sp>
+        <p:nvSpPr>
+          <p:cNvPr id="51" name="타원 50">
+            <a:extLst>
+              <a:ext uri="{FF2B5EF4-FFF2-40B4-BE49-F238E27FC236}">
+                <a16:creationId xmlns:a16="http://schemas.microsoft.com/office/drawing/2014/main" id="{76613553-D7D1-454D-A29D-7E72623E935E}"/>
+              </a:ext>
+            </a:extLst>
+          </p:cNvPr>
+          <p:cNvSpPr/>
+          <p:nvPr/>
+        </p:nvSpPr>
+        <p:spPr>
+          <a:xfrm>
+            <a:off x="3013643" y="4402382"/>
+            <a:ext cx="842962" cy="814387"/>
+          </a:xfrm>
+          <a:prstGeom prst="ellipse">
+            <a:avLst/>
+          </a:prstGeom>
+          <a:noFill/>
+        </p:spPr>
+        <p:style>
+          <a:lnRef idx="2">
+            <a:schemeClr val="dk1">
+              <a:shade val="50000"/>
+            </a:schemeClr>
+          </a:lnRef>
+          <a:fillRef idx="1">
+            <a:schemeClr val="dk1"/>
+          </a:fillRef>
+          <a:effectRef idx="0">
+            <a:schemeClr val="dk1"/>
+          </a:effectRef>
+          <a:fontRef idx="minor">
+            <a:schemeClr val="lt1"/>
+          </a:fontRef>
+        </p:style>
+        <p:txBody>
+          <a:bodyPr rtlCol="0" anchor="ctr"/>
+          <a:lstStyle/>
+          <a:p>
+            <a:pPr algn="ctr"/>
+            <a:r>
+              <a:rPr lang="en-US" altLang="ko-KR" sz="3200" dirty="0">
+                <a:solidFill>
+                  <a:schemeClr val="tx1"/>
+                </a:solidFill>
+              </a:rPr>
+              <a:t>1</a:t>
+            </a:r>
+            <a:endParaRPr lang="ko-KR" altLang="en-US" sz="3200" dirty="0">
+              <a:solidFill>
+                <a:schemeClr val="tx1"/>
+              </a:solidFill>
+            </a:endParaRPr>
+          </a:p>
+        </p:txBody>
+      </p:sp>
+      <p:cxnSp>
+        <p:nvCxnSpPr>
+          <p:cNvPr id="16" name="직선 연결선 15">
+            <a:extLst>
+              <a:ext uri="{FF2B5EF4-FFF2-40B4-BE49-F238E27FC236}">
+                <a16:creationId xmlns:a16="http://schemas.microsoft.com/office/drawing/2014/main" id="{A5DC94D9-2D54-4AFF-96DD-C4484055E7A6}"/>
+              </a:ext>
+            </a:extLst>
+          </p:cNvPr>
+          <p:cNvCxnSpPr>
+            <a:stCxn id="42" idx="3"/>
+            <a:endCxn id="47" idx="0"/>
+          </p:cNvCxnSpPr>
+          <p:nvPr/>
+        </p:nvCxnSpPr>
+        <p:spPr>
+          <a:xfrm flipH="1">
+            <a:off x="4541927" y="1954254"/>
+            <a:ext cx="1147270" cy="905074"/>
+          </a:xfrm>
+          <a:prstGeom prst="line">
+            <a:avLst/>
+          </a:prstGeom>
+        </p:spPr>
+        <p:style>
+          <a:lnRef idx="1">
+            <a:schemeClr val="dk1"/>
+          </a:lnRef>
+          <a:fillRef idx="0">
+            <a:schemeClr val="dk1"/>
+          </a:fillRef>
+          <a:effectRef idx="0">
+            <a:schemeClr val="dk1"/>
+          </a:effectRef>
+          <a:fontRef idx="minor">
+            <a:schemeClr val="tx1"/>
+          </a:fontRef>
+        </p:style>
+      </p:cxnSp>
+      <p:cxnSp>
+        <p:nvCxnSpPr>
+          <p:cNvPr id="18" name="직선 연결선 17">
+            <a:extLst>
+              <a:ext uri="{FF2B5EF4-FFF2-40B4-BE49-F238E27FC236}">
+                <a16:creationId xmlns:a16="http://schemas.microsoft.com/office/drawing/2014/main" id="{7F131259-FAE2-4864-8844-285D43D73BBB}"/>
+              </a:ext>
+            </a:extLst>
+          </p:cNvPr>
+          <p:cNvCxnSpPr>
+            <a:stCxn id="47" idx="3"/>
+            <a:endCxn id="51" idx="0"/>
+          </p:cNvCxnSpPr>
+          <p:nvPr/>
+        </p:nvCxnSpPr>
+        <p:spPr>
+          <a:xfrm flipH="1">
+            <a:off x="3435124" y="3554451"/>
+            <a:ext cx="808771" cy="847931"/>
+          </a:xfrm>
+          <a:prstGeom prst="line">
+            <a:avLst/>
+          </a:prstGeom>
+        </p:spPr>
+        <p:style>
+          <a:lnRef idx="1">
+            <a:schemeClr val="dk1"/>
+          </a:lnRef>
+          <a:fillRef idx="0">
+            <a:schemeClr val="dk1"/>
+          </a:fillRef>
+          <a:effectRef idx="0">
+            <a:schemeClr val="dk1"/>
+          </a:effectRef>
+          <a:fontRef idx="minor">
+            <a:schemeClr val="tx1"/>
+          </a:fontRef>
+        </p:style>
+      </p:cxnSp>
+      <p:cxnSp>
+        <p:nvCxnSpPr>
+          <p:cNvPr id="20" name="직선 연결선 19">
+            <a:extLst>
+              <a:ext uri="{FF2B5EF4-FFF2-40B4-BE49-F238E27FC236}">
+                <a16:creationId xmlns:a16="http://schemas.microsoft.com/office/drawing/2014/main" id="{0B8E17D1-D681-4B9F-836B-B5D5C002EB81}"/>
+              </a:ext>
+            </a:extLst>
+          </p:cNvPr>
+          <p:cNvCxnSpPr>
+            <a:stCxn id="47" idx="5"/>
+            <a:endCxn id="50" idx="0"/>
+          </p:cNvCxnSpPr>
+          <p:nvPr/>
+        </p:nvCxnSpPr>
+        <p:spPr>
+          <a:xfrm>
+            <a:off x="4839959" y="3554451"/>
+            <a:ext cx="808774" cy="847931"/>
+          </a:xfrm>
+          <a:prstGeom prst="line">
+            <a:avLst/>
+          </a:prstGeom>
+        </p:spPr>
+        <p:style>
+          <a:lnRef idx="1">
+            <a:schemeClr val="dk1"/>
+          </a:lnRef>
+          <a:fillRef idx="0">
+            <a:schemeClr val="dk1"/>
+          </a:fillRef>
+          <a:effectRef idx="0">
+            <a:schemeClr val="dk1"/>
+          </a:effectRef>
+          <a:fontRef idx="minor">
+            <a:schemeClr val="tx1"/>
+          </a:fontRef>
+        </p:style>
+      </p:cxnSp>
+      <p:cxnSp>
+        <p:nvCxnSpPr>
+          <p:cNvPr id="29" name="직선 연결선 28">
+            <a:extLst>
+              <a:ext uri="{FF2B5EF4-FFF2-40B4-BE49-F238E27FC236}">
+                <a16:creationId xmlns:a16="http://schemas.microsoft.com/office/drawing/2014/main" id="{BC052159-12D0-4300-8B07-890AF53A1396}"/>
+              </a:ext>
+            </a:extLst>
+          </p:cNvPr>
+          <p:cNvCxnSpPr>
+            <a:cxnSpLocks/>
+            <a:stCxn id="42" idx="5"/>
+            <a:endCxn id="48" idx="0"/>
+          </p:cNvCxnSpPr>
+          <p:nvPr/>
+        </p:nvCxnSpPr>
+        <p:spPr>
+          <a:xfrm>
+            <a:off x="6285261" y="1954254"/>
+            <a:ext cx="1287967" cy="905074"/>
+          </a:xfrm>
+          <a:prstGeom prst="line">
+            <a:avLst/>
+          </a:prstGeom>
+        </p:spPr>
+        <p:style>
+          <a:lnRef idx="1">
+            <a:schemeClr val="dk1"/>
+          </a:lnRef>
+          <a:fillRef idx="0">
+            <a:schemeClr val="dk1"/>
+          </a:fillRef>
+          <a:effectRef idx="0">
+            <a:schemeClr val="dk1"/>
+          </a:effectRef>
+          <a:fontRef idx="minor">
+            <a:schemeClr val="tx1"/>
+          </a:fontRef>
+        </p:style>
+      </p:cxnSp>
+      <p:sp>
+        <p:nvSpPr>
+          <p:cNvPr id="3" name="TextBox 2">
+            <a:extLst>
+              <a:ext uri="{FF2B5EF4-FFF2-40B4-BE49-F238E27FC236}">
+                <a16:creationId xmlns:a16="http://schemas.microsoft.com/office/drawing/2014/main" id="{45662732-21A5-472B-BD8A-10B7E0D08CC2}"/>
+              </a:ext>
+            </a:extLst>
+          </p:cNvPr>
+          <p:cNvSpPr txBox="1"/>
+          <p:nvPr/>
+        </p:nvSpPr>
+        <p:spPr>
+          <a:xfrm>
+            <a:off x="5420529" y="872339"/>
+            <a:ext cx="1042273" cy="369332"/>
+          </a:xfrm>
+          <a:prstGeom prst="rect">
+            <a:avLst/>
+          </a:prstGeom>
+          <a:noFill/>
+        </p:spPr>
+        <p:txBody>
+          <a:bodyPr wrap="none" rtlCol="0">
+            <a:spAutoFit/>
+          </a:bodyPr>
+          <a:lstStyle/>
+          <a:p>
+            <a:r>
+              <a:rPr lang="en-US" altLang="ko-KR" dirty="0"/>
+              <a:t>1) 8 &gt; 7</a:t>
+            </a:r>
+            <a:endParaRPr lang="ko-KR" altLang="en-US" dirty="0"/>
+          </a:p>
+        </p:txBody>
+      </p:sp>
+    </p:spTree>
+    <p:extLst>
+      <p:ext uri="{BB962C8B-B14F-4D97-AF65-F5344CB8AC3E}">
+        <p14:creationId xmlns:p14="http://schemas.microsoft.com/office/powerpoint/2010/main" val="3027428887"/>
+      </p:ext>
+    </p:extLst>
+  </p:cSld>
+  <p:clrMapOvr>
+    <a:masterClrMapping/>
+  </p:clrMapOvr>
+</p:sld>
+</file>
+
+<file path=ppt/slides/slide6.xml><?xml version="1.0" encoding="utf-8"?>
+<p:sld xmlns:a="http://schemas.openxmlformats.org/drawingml/2006/main" xmlns:r="http://schemas.openxmlformats.org/officeDocument/2006/relationships" xmlns:p="http://schemas.openxmlformats.org/presentationml/2006/main">
+  <p:cSld>
+    <p:spTree>
+      <p:nvGrpSpPr>
+        <p:cNvPr id="1" name=""/>
+        <p:cNvGrpSpPr/>
+        <p:nvPr/>
+      </p:nvGrpSpPr>
+      <p:grpSpPr>
+        <a:xfrm>
+          <a:off x="0" y="0"/>
+          <a:ext cx="0" cy="0"/>
+          <a:chOff x="0" y="0"/>
+          <a:chExt cx="0" cy="0"/>
+        </a:xfrm>
+      </p:grpSpPr>
+      <p:sp>
+        <p:nvSpPr>
+          <p:cNvPr id="42" name="타원 41">
+            <a:extLst>
+              <a:ext uri="{FF2B5EF4-FFF2-40B4-BE49-F238E27FC236}">
+                <a16:creationId xmlns:a16="http://schemas.microsoft.com/office/drawing/2014/main" id="{92ABCDEC-250B-40C0-8812-8B9257F6B78D}"/>
+              </a:ext>
+            </a:extLst>
+          </p:cNvPr>
+          <p:cNvSpPr/>
+          <p:nvPr/>
+        </p:nvSpPr>
+        <p:spPr>
+          <a:xfrm>
+            <a:off x="5565748" y="1259131"/>
+            <a:ext cx="842962" cy="814387"/>
+          </a:xfrm>
+          <a:prstGeom prst="ellipse">
+            <a:avLst/>
+          </a:prstGeom>
+          <a:noFill/>
+        </p:spPr>
+        <p:style>
+          <a:lnRef idx="2">
+            <a:schemeClr val="dk1">
+              <a:shade val="50000"/>
+            </a:schemeClr>
+          </a:lnRef>
+          <a:fillRef idx="1">
+            <a:schemeClr val="dk1"/>
+          </a:fillRef>
+          <a:effectRef idx="0">
+            <a:schemeClr val="dk1"/>
+          </a:effectRef>
+          <a:fontRef idx="minor">
+            <a:schemeClr val="lt1"/>
+          </a:fontRef>
+        </p:style>
+        <p:txBody>
+          <a:bodyPr rtlCol="0" anchor="ctr"/>
+          <a:lstStyle/>
+          <a:p>
+            <a:pPr algn="ctr"/>
+            <a:r>
+              <a:rPr lang="en-US" altLang="ko-KR" sz="3200" dirty="0">
+                <a:solidFill>
+                  <a:schemeClr val="tx1"/>
+                </a:solidFill>
+              </a:rPr>
+              <a:t>7</a:t>
+            </a:r>
+            <a:endParaRPr lang="ko-KR" altLang="en-US" sz="3200" dirty="0">
+              <a:solidFill>
+                <a:schemeClr val="tx1"/>
+              </a:solidFill>
+            </a:endParaRPr>
+          </a:p>
+        </p:txBody>
+      </p:sp>
+      <p:sp>
+        <p:nvSpPr>
+          <p:cNvPr id="47" name="타원 46">
+            <a:extLst>
+              <a:ext uri="{FF2B5EF4-FFF2-40B4-BE49-F238E27FC236}">
+                <a16:creationId xmlns:a16="http://schemas.microsoft.com/office/drawing/2014/main" id="{91893471-6591-4ACE-B7FD-2FE3D7EBE3A9}"/>
+              </a:ext>
+            </a:extLst>
+          </p:cNvPr>
+          <p:cNvSpPr/>
+          <p:nvPr/>
+        </p:nvSpPr>
+        <p:spPr>
+          <a:xfrm>
+            <a:off x="4120446" y="2859328"/>
+            <a:ext cx="842962" cy="814387"/>
+          </a:xfrm>
+          <a:prstGeom prst="ellipse">
+            <a:avLst/>
+          </a:prstGeom>
+          <a:noFill/>
+        </p:spPr>
+        <p:style>
+          <a:lnRef idx="2">
+            <a:schemeClr val="dk1">
+              <a:shade val="50000"/>
+            </a:schemeClr>
+          </a:lnRef>
+          <a:fillRef idx="1">
+            <a:schemeClr val="dk1"/>
+          </a:fillRef>
+          <a:effectRef idx="0">
+            <a:schemeClr val="dk1"/>
+          </a:effectRef>
+          <a:fontRef idx="minor">
+            <a:schemeClr val="lt1"/>
+          </a:fontRef>
+        </p:style>
+        <p:txBody>
+          <a:bodyPr rtlCol="0" anchor="ctr"/>
+          <a:lstStyle/>
+          <a:p>
+            <a:pPr algn="ctr"/>
+            <a:r>
+              <a:rPr lang="en-US" altLang="ko-KR" sz="3200" dirty="0">
+                <a:solidFill>
+                  <a:schemeClr val="tx1"/>
+                </a:solidFill>
+              </a:rPr>
+              <a:t>3</a:t>
+            </a:r>
+            <a:endParaRPr lang="ko-KR" altLang="en-US" sz="3200" dirty="0">
+              <a:solidFill>
+                <a:schemeClr val="tx1"/>
+              </a:solidFill>
+            </a:endParaRPr>
+          </a:p>
+        </p:txBody>
+      </p:sp>
+      <p:sp>
+        <p:nvSpPr>
+          <p:cNvPr id="48" name="타원 47">
+            <a:extLst>
+              <a:ext uri="{FF2B5EF4-FFF2-40B4-BE49-F238E27FC236}">
+                <a16:creationId xmlns:a16="http://schemas.microsoft.com/office/drawing/2014/main" id="{75833488-1488-4FC6-9393-C43992CEFD09}"/>
+              </a:ext>
+            </a:extLst>
+          </p:cNvPr>
+          <p:cNvSpPr/>
+          <p:nvPr/>
+        </p:nvSpPr>
+        <p:spPr>
+          <a:xfrm>
+            <a:off x="7110820" y="2859328"/>
+            <a:ext cx="842962" cy="814387"/>
+          </a:xfrm>
+          <a:prstGeom prst="ellipse">
+            <a:avLst/>
+          </a:prstGeom>
+          <a:noFill/>
+        </p:spPr>
+        <p:style>
+          <a:lnRef idx="2">
+            <a:schemeClr val="dk1">
+              <a:shade val="50000"/>
+            </a:schemeClr>
+          </a:lnRef>
+          <a:fillRef idx="1">
+            <a:schemeClr val="dk1"/>
+          </a:fillRef>
+          <a:effectRef idx="0">
+            <a:schemeClr val="dk1"/>
+          </a:effectRef>
+          <a:fontRef idx="minor">
+            <a:schemeClr val="lt1"/>
+          </a:fontRef>
+        </p:style>
+        <p:txBody>
+          <a:bodyPr rtlCol="0" anchor="ctr"/>
+          <a:lstStyle/>
+          <a:p>
+            <a:pPr algn="ctr"/>
+            <a:r>
+              <a:rPr lang="en-US" altLang="ko-KR" sz="3200" dirty="0">
+                <a:solidFill>
+                  <a:schemeClr val="tx1"/>
+                </a:solidFill>
+              </a:rPr>
+              <a:t>8</a:t>
+            </a:r>
+            <a:endParaRPr lang="ko-KR" altLang="en-US" sz="3200" dirty="0">
+              <a:solidFill>
+                <a:schemeClr val="tx1"/>
+              </a:solidFill>
+            </a:endParaRPr>
+          </a:p>
+        </p:txBody>
+      </p:sp>
+      <p:sp>
+        <p:nvSpPr>
+          <p:cNvPr id="50" name="타원 49">
+            <a:extLst>
+              <a:ext uri="{FF2B5EF4-FFF2-40B4-BE49-F238E27FC236}">
+                <a16:creationId xmlns:a16="http://schemas.microsoft.com/office/drawing/2014/main" id="{88AB90D7-60C5-42FD-B488-DB1174256B19}"/>
+              </a:ext>
+            </a:extLst>
+          </p:cNvPr>
+          <p:cNvSpPr/>
+          <p:nvPr/>
+        </p:nvSpPr>
+        <p:spPr>
+          <a:xfrm>
+            <a:off x="5227252" y="4402382"/>
+            <a:ext cx="842962" cy="814387"/>
+          </a:xfrm>
+          <a:prstGeom prst="ellipse">
+            <a:avLst/>
+          </a:prstGeom>
+          <a:noFill/>
+        </p:spPr>
+        <p:style>
+          <a:lnRef idx="2">
+            <a:schemeClr val="dk1">
+              <a:shade val="50000"/>
+            </a:schemeClr>
+          </a:lnRef>
+          <a:fillRef idx="1">
+            <a:schemeClr val="dk1"/>
+          </a:fillRef>
+          <a:effectRef idx="0">
+            <a:schemeClr val="dk1"/>
+          </a:effectRef>
+          <a:fontRef idx="minor">
+            <a:schemeClr val="lt1"/>
+          </a:fontRef>
+        </p:style>
+        <p:txBody>
+          <a:bodyPr rtlCol="0" anchor="ctr"/>
+          <a:lstStyle/>
+          <a:p>
+            <a:pPr algn="ctr"/>
+            <a:r>
+              <a:rPr lang="en-US" altLang="ko-KR" sz="3200" dirty="0">
+                <a:solidFill>
+                  <a:schemeClr val="tx1"/>
+                </a:solidFill>
+              </a:rPr>
+              <a:t>5</a:t>
+            </a:r>
+            <a:endParaRPr lang="ko-KR" altLang="en-US" sz="3200" dirty="0">
+              <a:solidFill>
+                <a:schemeClr val="tx1"/>
+              </a:solidFill>
+            </a:endParaRPr>
+          </a:p>
+        </p:txBody>
+      </p:sp>
+      <p:sp>
+        <p:nvSpPr>
+          <p:cNvPr id="51" name="타원 50">
+            <a:extLst>
+              <a:ext uri="{FF2B5EF4-FFF2-40B4-BE49-F238E27FC236}">
+                <a16:creationId xmlns:a16="http://schemas.microsoft.com/office/drawing/2014/main" id="{76613553-D7D1-454D-A29D-7E72623E935E}"/>
+              </a:ext>
+            </a:extLst>
+          </p:cNvPr>
+          <p:cNvSpPr/>
+          <p:nvPr/>
+        </p:nvSpPr>
+        <p:spPr>
+          <a:xfrm>
+            <a:off x="3013643" y="4402382"/>
+            <a:ext cx="842962" cy="814387"/>
+          </a:xfrm>
+          <a:prstGeom prst="ellipse">
+            <a:avLst/>
+          </a:prstGeom>
+          <a:noFill/>
+        </p:spPr>
+        <p:style>
+          <a:lnRef idx="2">
+            <a:schemeClr val="dk1">
+              <a:shade val="50000"/>
+            </a:schemeClr>
+          </a:lnRef>
+          <a:fillRef idx="1">
+            <a:schemeClr val="dk1"/>
+          </a:fillRef>
+          <a:effectRef idx="0">
+            <a:schemeClr val="dk1"/>
+          </a:effectRef>
+          <a:fontRef idx="minor">
+            <a:schemeClr val="lt1"/>
+          </a:fontRef>
+        </p:style>
+        <p:txBody>
+          <a:bodyPr rtlCol="0" anchor="ctr"/>
+          <a:lstStyle/>
+          <a:p>
+            <a:pPr algn="ctr"/>
+            <a:r>
+              <a:rPr lang="en-US" altLang="ko-KR" sz="3200" dirty="0">
+                <a:solidFill>
+                  <a:schemeClr val="tx1"/>
+                </a:solidFill>
+              </a:rPr>
+              <a:t>1</a:t>
+            </a:r>
+            <a:endParaRPr lang="ko-KR" altLang="en-US" sz="3200" dirty="0">
+              <a:solidFill>
+                <a:schemeClr val="tx1"/>
+              </a:solidFill>
+            </a:endParaRPr>
+          </a:p>
+        </p:txBody>
+      </p:sp>
+      <p:cxnSp>
+        <p:nvCxnSpPr>
+          <p:cNvPr id="16" name="직선 연결선 15">
+            <a:extLst>
+              <a:ext uri="{FF2B5EF4-FFF2-40B4-BE49-F238E27FC236}">
+                <a16:creationId xmlns:a16="http://schemas.microsoft.com/office/drawing/2014/main" id="{A5DC94D9-2D54-4AFF-96DD-C4484055E7A6}"/>
+              </a:ext>
+            </a:extLst>
+          </p:cNvPr>
+          <p:cNvCxnSpPr>
+            <a:stCxn id="42" idx="3"/>
+            <a:endCxn id="47" idx="0"/>
+          </p:cNvCxnSpPr>
+          <p:nvPr/>
+        </p:nvCxnSpPr>
+        <p:spPr>
+          <a:xfrm flipH="1">
+            <a:off x="4541927" y="1954254"/>
+            <a:ext cx="1147270" cy="905074"/>
+          </a:xfrm>
+          <a:prstGeom prst="line">
+            <a:avLst/>
+          </a:prstGeom>
+        </p:spPr>
+        <p:style>
+          <a:lnRef idx="1">
+            <a:schemeClr val="dk1"/>
+          </a:lnRef>
+          <a:fillRef idx="0">
+            <a:schemeClr val="dk1"/>
+          </a:fillRef>
+          <a:effectRef idx="0">
+            <a:schemeClr val="dk1"/>
+          </a:effectRef>
+          <a:fontRef idx="minor">
+            <a:schemeClr val="tx1"/>
+          </a:fontRef>
+        </p:style>
+      </p:cxnSp>
+      <p:cxnSp>
+        <p:nvCxnSpPr>
+          <p:cNvPr id="18" name="직선 연결선 17">
+            <a:extLst>
+              <a:ext uri="{FF2B5EF4-FFF2-40B4-BE49-F238E27FC236}">
+                <a16:creationId xmlns:a16="http://schemas.microsoft.com/office/drawing/2014/main" id="{7F131259-FAE2-4864-8844-285D43D73BBB}"/>
+              </a:ext>
+            </a:extLst>
+          </p:cNvPr>
+          <p:cNvCxnSpPr>
+            <a:stCxn id="47" idx="3"/>
+            <a:endCxn id="51" idx="0"/>
+          </p:cNvCxnSpPr>
+          <p:nvPr/>
+        </p:nvCxnSpPr>
+        <p:spPr>
+          <a:xfrm flipH="1">
+            <a:off x="3435124" y="3554451"/>
+            <a:ext cx="808771" cy="847931"/>
+          </a:xfrm>
+          <a:prstGeom prst="line">
+            <a:avLst/>
+          </a:prstGeom>
+        </p:spPr>
+        <p:style>
+          <a:lnRef idx="1">
+            <a:schemeClr val="dk1"/>
+          </a:lnRef>
+          <a:fillRef idx="0">
+            <a:schemeClr val="dk1"/>
+          </a:fillRef>
+          <a:effectRef idx="0">
+            <a:schemeClr val="dk1"/>
+          </a:effectRef>
+          <a:fontRef idx="minor">
+            <a:schemeClr val="tx1"/>
+          </a:fontRef>
+        </p:style>
+      </p:cxnSp>
+      <p:cxnSp>
+        <p:nvCxnSpPr>
+          <p:cNvPr id="20" name="직선 연결선 19">
+            <a:extLst>
+              <a:ext uri="{FF2B5EF4-FFF2-40B4-BE49-F238E27FC236}">
+                <a16:creationId xmlns:a16="http://schemas.microsoft.com/office/drawing/2014/main" id="{0B8E17D1-D681-4B9F-836B-B5D5C002EB81}"/>
+              </a:ext>
+            </a:extLst>
+          </p:cNvPr>
+          <p:cNvCxnSpPr>
+            <a:stCxn id="47" idx="5"/>
+            <a:endCxn id="50" idx="0"/>
+          </p:cNvCxnSpPr>
+          <p:nvPr/>
+        </p:nvCxnSpPr>
+        <p:spPr>
+          <a:xfrm>
+            <a:off x="4839959" y="3554451"/>
+            <a:ext cx="808774" cy="847931"/>
+          </a:xfrm>
+          <a:prstGeom prst="line">
+            <a:avLst/>
+          </a:prstGeom>
+        </p:spPr>
+        <p:style>
+          <a:lnRef idx="1">
+            <a:schemeClr val="dk1"/>
+          </a:lnRef>
+          <a:fillRef idx="0">
+            <a:schemeClr val="dk1"/>
+          </a:fillRef>
+          <a:effectRef idx="0">
+            <a:schemeClr val="dk1"/>
+          </a:effectRef>
+          <a:fontRef idx="minor">
+            <a:schemeClr val="tx1"/>
+          </a:fontRef>
+        </p:style>
+      </p:cxnSp>
+      <p:cxnSp>
+        <p:nvCxnSpPr>
+          <p:cNvPr id="29" name="직선 연결선 28">
+            <a:extLst>
+              <a:ext uri="{FF2B5EF4-FFF2-40B4-BE49-F238E27FC236}">
+                <a16:creationId xmlns:a16="http://schemas.microsoft.com/office/drawing/2014/main" id="{BC052159-12D0-4300-8B07-890AF53A1396}"/>
+              </a:ext>
+            </a:extLst>
+          </p:cNvPr>
+          <p:cNvCxnSpPr>
+            <a:stCxn id="42" idx="5"/>
+            <a:endCxn id="48" idx="0"/>
+          </p:cNvCxnSpPr>
+          <p:nvPr/>
+        </p:nvCxnSpPr>
+        <p:spPr>
+          <a:xfrm>
+            <a:off x="6285261" y="1954254"/>
+            <a:ext cx="1247040" cy="905074"/>
+          </a:xfrm>
+          <a:prstGeom prst="line">
+            <a:avLst/>
+          </a:prstGeom>
+        </p:spPr>
+        <p:style>
+          <a:lnRef idx="1">
+            <a:schemeClr val="dk1"/>
+          </a:lnRef>
+          <a:fillRef idx="0">
+            <a:schemeClr val="dk1"/>
+          </a:fillRef>
+          <a:effectRef idx="0">
+            <a:schemeClr val="dk1"/>
+          </a:effectRef>
+          <a:fontRef idx="minor">
+            <a:schemeClr val="tx1"/>
+          </a:fontRef>
+        </p:style>
+      </p:cxnSp>
+      <p:sp>
+        <p:nvSpPr>
+          <p:cNvPr id="49" name="타원 48">
+            <a:extLst>
+              <a:ext uri="{FF2B5EF4-FFF2-40B4-BE49-F238E27FC236}">
+                <a16:creationId xmlns:a16="http://schemas.microsoft.com/office/drawing/2014/main" id="{6A77E7DA-3680-42BE-9257-9E7451136604}"/>
+              </a:ext>
+            </a:extLst>
+          </p:cNvPr>
+          <p:cNvSpPr/>
+          <p:nvPr/>
+        </p:nvSpPr>
+        <p:spPr>
+          <a:xfrm>
+            <a:off x="8269937" y="4402381"/>
+            <a:ext cx="908420" cy="814387"/>
+          </a:xfrm>
+          <a:prstGeom prst="ellipse">
+            <a:avLst/>
+          </a:prstGeom>
+          <a:noFill/>
+        </p:spPr>
+        <p:style>
+          <a:lnRef idx="2">
+            <a:schemeClr val="dk1">
+              <a:shade val="50000"/>
+            </a:schemeClr>
+          </a:lnRef>
+          <a:fillRef idx="1">
+            <a:schemeClr val="dk1"/>
+          </a:fillRef>
+          <a:effectRef idx="0">
+            <a:schemeClr val="dk1"/>
+          </a:effectRef>
+          <a:fontRef idx="minor">
+            <a:schemeClr val="lt1"/>
+          </a:fontRef>
+        </p:style>
+        <p:txBody>
+          <a:bodyPr rtlCol="0" anchor="ctr"/>
+          <a:lstStyle/>
+          <a:p>
+            <a:pPr algn="ctr"/>
+            <a:r>
+              <a:rPr lang="en-US" altLang="ko-KR" sz="3200" dirty="0">
+                <a:solidFill>
+                  <a:schemeClr val="tx1"/>
+                </a:solidFill>
+              </a:rPr>
+              <a:t>10</a:t>
+            </a:r>
+            <a:endParaRPr lang="ko-KR" altLang="en-US" sz="3200" dirty="0">
+              <a:solidFill>
+                <a:schemeClr val="tx1"/>
+              </a:solidFill>
+            </a:endParaRPr>
+          </a:p>
+        </p:txBody>
+      </p:sp>
+      <p:cxnSp>
+        <p:nvCxnSpPr>
+          <p:cNvPr id="60" name="직선 연결선 59">
+            <a:extLst>
+              <a:ext uri="{FF2B5EF4-FFF2-40B4-BE49-F238E27FC236}">
+                <a16:creationId xmlns:a16="http://schemas.microsoft.com/office/drawing/2014/main" id="{74125205-87BC-4F44-A4AD-7B48B734FF8D}"/>
+              </a:ext>
+            </a:extLst>
+          </p:cNvPr>
+          <p:cNvCxnSpPr>
+            <a:cxnSpLocks/>
+            <a:stCxn id="48" idx="5"/>
+            <a:endCxn id="49" idx="0"/>
+          </p:cNvCxnSpPr>
+          <p:nvPr/>
+        </p:nvCxnSpPr>
+        <p:spPr>
+          <a:xfrm>
+            <a:off x="7830333" y="3554451"/>
+            <a:ext cx="893814" cy="847930"/>
+          </a:xfrm>
+          <a:prstGeom prst="line">
+            <a:avLst/>
+          </a:prstGeom>
+        </p:spPr>
+        <p:style>
+          <a:lnRef idx="1">
+            <a:schemeClr val="dk1"/>
+          </a:lnRef>
+          <a:fillRef idx="0">
+            <a:schemeClr val="dk1"/>
+          </a:fillRef>
+          <a:effectRef idx="0">
+            <a:schemeClr val="dk1"/>
+          </a:effectRef>
+          <a:fontRef idx="minor">
+            <a:schemeClr val="tx1"/>
+          </a:fontRef>
+        </p:style>
+      </p:cxnSp>
+    </p:spTree>
+    <p:extLst>
+      <p:ext uri="{BB962C8B-B14F-4D97-AF65-F5344CB8AC3E}">
+        <p14:creationId xmlns:p14="http://schemas.microsoft.com/office/powerpoint/2010/main" val="3033649204"/>
+      </p:ext>
+    </p:extLst>
+  </p:cSld>
+  <p:clrMapOvr>
+    <a:masterClrMapping/>
+  </p:clrMapOvr>
+</p:sld>
+</file>
+
+<file path=ppt/slides/slide7.xml><?xml version="1.0" encoding="utf-8"?>
+<p:sld xmlns:a="http://schemas.openxmlformats.org/drawingml/2006/main" xmlns:r="http://schemas.openxmlformats.org/officeDocument/2006/relationships" xmlns:p="http://schemas.openxmlformats.org/presentationml/2006/main">
+  <p:cSld>
+    <p:spTree>
+      <p:nvGrpSpPr>
+        <p:cNvPr id="1" name=""/>
+        <p:cNvGrpSpPr/>
+        <p:nvPr/>
+      </p:nvGrpSpPr>
+      <p:grpSpPr>
+        <a:xfrm>
+          <a:off x="0" y="0"/>
+          <a:ext cx="0" cy="0"/>
+          <a:chOff x="0" y="0"/>
+          <a:chExt cx="0" cy="0"/>
+        </a:xfrm>
+      </p:grpSpPr>
+      <p:sp>
+        <p:nvSpPr>
+          <p:cNvPr id="42" name="타원 41">
+            <a:extLst>
+              <a:ext uri="{FF2B5EF4-FFF2-40B4-BE49-F238E27FC236}">
+                <a16:creationId xmlns:a16="http://schemas.microsoft.com/office/drawing/2014/main" id="{92ABCDEC-250B-40C0-8812-8B9257F6B78D}"/>
+              </a:ext>
+            </a:extLst>
+          </p:cNvPr>
+          <p:cNvSpPr/>
+          <p:nvPr/>
+        </p:nvSpPr>
+        <p:spPr>
+          <a:xfrm>
+            <a:off x="5565748" y="1259131"/>
+            <a:ext cx="842962" cy="814387"/>
+          </a:xfrm>
+          <a:prstGeom prst="ellipse">
+            <a:avLst/>
+          </a:prstGeom>
+          <a:noFill/>
+        </p:spPr>
+        <p:style>
+          <a:lnRef idx="2">
+            <a:schemeClr val="dk1">
+              <a:shade val="50000"/>
+            </a:schemeClr>
+          </a:lnRef>
+          <a:fillRef idx="1">
+            <a:schemeClr val="dk1"/>
+          </a:fillRef>
+          <a:effectRef idx="0">
+            <a:schemeClr val="dk1"/>
+          </a:effectRef>
+          <a:fontRef idx="minor">
+            <a:schemeClr val="lt1"/>
+          </a:fontRef>
+        </p:style>
+        <p:txBody>
+          <a:bodyPr rtlCol="0" anchor="ctr"/>
+          <a:lstStyle/>
+          <a:p>
+            <a:pPr algn="ctr"/>
+            <a:r>
+              <a:rPr lang="en-US" altLang="ko-KR" sz="3200" dirty="0">
+                <a:solidFill>
+                  <a:schemeClr val="tx1"/>
+                </a:solidFill>
+              </a:rPr>
+              <a:t>5</a:t>
+            </a:r>
+            <a:endParaRPr lang="ko-KR" altLang="en-US" sz="3200" dirty="0">
+              <a:solidFill>
+                <a:schemeClr val="tx1"/>
+              </a:solidFill>
+            </a:endParaRPr>
+          </a:p>
+        </p:txBody>
+      </p:sp>
+      <p:sp>
+        <p:nvSpPr>
+          <p:cNvPr id="47" name="타원 46">
+            <a:extLst>
+              <a:ext uri="{FF2B5EF4-FFF2-40B4-BE49-F238E27FC236}">
+                <a16:creationId xmlns:a16="http://schemas.microsoft.com/office/drawing/2014/main" id="{91893471-6591-4ACE-B7FD-2FE3D7EBE3A9}"/>
+              </a:ext>
+            </a:extLst>
+          </p:cNvPr>
+          <p:cNvSpPr/>
+          <p:nvPr/>
+        </p:nvSpPr>
+        <p:spPr>
+          <a:xfrm>
+            <a:off x="4120446" y="2859328"/>
+            <a:ext cx="842962" cy="814387"/>
+          </a:xfrm>
+          <a:prstGeom prst="ellipse">
+            <a:avLst/>
+          </a:prstGeom>
+          <a:noFill/>
+        </p:spPr>
+        <p:style>
+          <a:lnRef idx="2">
+            <a:schemeClr val="dk1">
+              <a:shade val="50000"/>
+            </a:schemeClr>
+          </a:lnRef>
+          <a:fillRef idx="1">
+            <a:schemeClr val="dk1"/>
+          </a:fillRef>
+          <a:effectRef idx="0">
+            <a:schemeClr val="dk1"/>
+          </a:effectRef>
+          <a:fontRef idx="minor">
+            <a:schemeClr val="lt1"/>
+          </a:fontRef>
+        </p:style>
+        <p:txBody>
+          <a:bodyPr rtlCol="0" anchor="ctr"/>
+          <a:lstStyle/>
+          <a:p>
+            <a:pPr algn="ctr"/>
+            <a:r>
+              <a:rPr lang="en-US" altLang="ko-KR" sz="3200" dirty="0">
+                <a:solidFill>
+                  <a:schemeClr val="tx1"/>
+                </a:solidFill>
+              </a:rPr>
+              <a:t>3</a:t>
+            </a:r>
+            <a:endParaRPr lang="ko-KR" altLang="en-US" sz="3200" dirty="0">
+              <a:solidFill>
+                <a:schemeClr val="tx1"/>
+              </a:solidFill>
+            </a:endParaRPr>
+          </a:p>
+        </p:txBody>
+      </p:sp>
+      <p:sp>
+        <p:nvSpPr>
+          <p:cNvPr id="48" name="타원 47">
+            <a:extLst>
+              <a:ext uri="{FF2B5EF4-FFF2-40B4-BE49-F238E27FC236}">
+                <a16:creationId xmlns:a16="http://schemas.microsoft.com/office/drawing/2014/main" id="{75833488-1488-4FC6-9393-C43992CEFD09}"/>
+              </a:ext>
+            </a:extLst>
+          </p:cNvPr>
+          <p:cNvSpPr/>
+          <p:nvPr/>
+        </p:nvSpPr>
+        <p:spPr>
+          <a:xfrm>
+            <a:off x="7110820" y="2859328"/>
+            <a:ext cx="842962" cy="814387"/>
+          </a:xfrm>
+          <a:prstGeom prst="ellipse">
+            <a:avLst/>
+          </a:prstGeom>
+          <a:noFill/>
+        </p:spPr>
+        <p:style>
+          <a:lnRef idx="2">
+            <a:schemeClr val="dk1">
+              <a:shade val="50000"/>
+            </a:schemeClr>
+          </a:lnRef>
+          <a:fillRef idx="1">
+            <a:schemeClr val="dk1"/>
+          </a:fillRef>
+          <a:effectRef idx="0">
+            <a:schemeClr val="dk1"/>
+          </a:effectRef>
+          <a:fontRef idx="minor">
+            <a:schemeClr val="lt1"/>
+          </a:fontRef>
+        </p:style>
+        <p:txBody>
+          <a:bodyPr rtlCol="0" anchor="ctr"/>
+          <a:lstStyle/>
+          <a:p>
+            <a:pPr algn="ctr"/>
+            <a:r>
+              <a:rPr lang="en-US" altLang="ko-KR" sz="3200" dirty="0">
+                <a:solidFill>
+                  <a:schemeClr val="tx1"/>
+                </a:solidFill>
+              </a:rPr>
+              <a:t>8</a:t>
+            </a:r>
+            <a:endParaRPr lang="ko-KR" altLang="en-US" sz="3200" dirty="0">
+              <a:solidFill>
+                <a:schemeClr val="tx1"/>
+              </a:solidFill>
+            </a:endParaRPr>
+          </a:p>
+        </p:txBody>
+      </p:sp>
+      <p:sp>
+        <p:nvSpPr>
+          <p:cNvPr id="51" name="타원 50">
+            <a:extLst>
+              <a:ext uri="{FF2B5EF4-FFF2-40B4-BE49-F238E27FC236}">
+                <a16:creationId xmlns:a16="http://schemas.microsoft.com/office/drawing/2014/main" id="{76613553-D7D1-454D-A29D-7E72623E935E}"/>
+              </a:ext>
+            </a:extLst>
+          </p:cNvPr>
+          <p:cNvSpPr/>
+          <p:nvPr/>
+        </p:nvSpPr>
+        <p:spPr>
+          <a:xfrm>
+            <a:off x="3013643" y="4402382"/>
+            <a:ext cx="842962" cy="814387"/>
+          </a:xfrm>
+          <a:prstGeom prst="ellipse">
+            <a:avLst/>
+          </a:prstGeom>
+          <a:noFill/>
+        </p:spPr>
+        <p:style>
+          <a:lnRef idx="2">
+            <a:schemeClr val="dk1">
+              <a:shade val="50000"/>
+            </a:schemeClr>
+          </a:lnRef>
+          <a:fillRef idx="1">
+            <a:schemeClr val="dk1"/>
+          </a:fillRef>
+          <a:effectRef idx="0">
+            <a:schemeClr val="dk1"/>
+          </a:effectRef>
+          <a:fontRef idx="minor">
+            <a:schemeClr val="lt1"/>
+          </a:fontRef>
+        </p:style>
+        <p:txBody>
+          <a:bodyPr rtlCol="0" anchor="ctr"/>
+          <a:lstStyle/>
+          <a:p>
+            <a:pPr algn="ctr"/>
+            <a:r>
+              <a:rPr lang="en-US" altLang="ko-KR" sz="3200" dirty="0">
+                <a:solidFill>
+                  <a:schemeClr val="tx1"/>
+                </a:solidFill>
+              </a:rPr>
+              <a:t>1</a:t>
+            </a:r>
+            <a:endParaRPr lang="ko-KR" altLang="en-US" sz="3200" dirty="0">
+              <a:solidFill>
+                <a:schemeClr val="tx1"/>
+              </a:solidFill>
+            </a:endParaRPr>
+          </a:p>
+        </p:txBody>
+      </p:sp>
+      <p:cxnSp>
+        <p:nvCxnSpPr>
+          <p:cNvPr id="16" name="직선 연결선 15">
+            <a:extLst>
+              <a:ext uri="{FF2B5EF4-FFF2-40B4-BE49-F238E27FC236}">
+                <a16:creationId xmlns:a16="http://schemas.microsoft.com/office/drawing/2014/main" id="{A5DC94D9-2D54-4AFF-96DD-C4484055E7A6}"/>
+              </a:ext>
+            </a:extLst>
+          </p:cNvPr>
+          <p:cNvCxnSpPr>
+            <a:stCxn id="42" idx="3"/>
+            <a:endCxn id="47" idx="0"/>
+          </p:cNvCxnSpPr>
+          <p:nvPr/>
+        </p:nvCxnSpPr>
+        <p:spPr>
+          <a:xfrm flipH="1">
+            <a:off x="4541927" y="1954254"/>
+            <a:ext cx="1147270" cy="905074"/>
+          </a:xfrm>
+          <a:prstGeom prst="line">
+            <a:avLst/>
+          </a:prstGeom>
+        </p:spPr>
+        <p:style>
+          <a:lnRef idx="1">
+            <a:schemeClr val="dk1"/>
+          </a:lnRef>
+          <a:fillRef idx="0">
+            <a:schemeClr val="dk1"/>
+          </a:fillRef>
+          <a:effectRef idx="0">
+            <a:schemeClr val="dk1"/>
+          </a:effectRef>
+          <a:fontRef idx="minor">
+            <a:schemeClr val="tx1"/>
+          </a:fontRef>
+        </p:style>
+      </p:cxnSp>
+      <p:cxnSp>
+        <p:nvCxnSpPr>
+          <p:cNvPr id="18" name="직선 연결선 17">
+            <a:extLst>
+              <a:ext uri="{FF2B5EF4-FFF2-40B4-BE49-F238E27FC236}">
+                <a16:creationId xmlns:a16="http://schemas.microsoft.com/office/drawing/2014/main" id="{7F131259-FAE2-4864-8844-285D43D73BBB}"/>
+              </a:ext>
+            </a:extLst>
+          </p:cNvPr>
+          <p:cNvCxnSpPr>
+            <a:stCxn id="47" idx="3"/>
+            <a:endCxn id="51" idx="0"/>
+          </p:cNvCxnSpPr>
+          <p:nvPr/>
+        </p:nvCxnSpPr>
+        <p:spPr>
+          <a:xfrm flipH="1">
+            <a:off x="3435124" y="3554451"/>
+            <a:ext cx="808771" cy="847931"/>
+          </a:xfrm>
+          <a:prstGeom prst="line">
+            <a:avLst/>
+          </a:prstGeom>
+        </p:spPr>
+        <p:style>
+          <a:lnRef idx="1">
+            <a:schemeClr val="dk1"/>
+          </a:lnRef>
+          <a:fillRef idx="0">
+            <a:schemeClr val="dk1"/>
+          </a:fillRef>
+          <a:effectRef idx="0">
+            <a:schemeClr val="dk1"/>
+          </a:effectRef>
+          <a:fontRef idx="minor">
+            <a:schemeClr val="tx1"/>
+          </a:fontRef>
+        </p:style>
+      </p:cxnSp>
+      <p:cxnSp>
+        <p:nvCxnSpPr>
+          <p:cNvPr id="29" name="직선 연결선 28">
+            <a:extLst>
+              <a:ext uri="{FF2B5EF4-FFF2-40B4-BE49-F238E27FC236}">
+                <a16:creationId xmlns:a16="http://schemas.microsoft.com/office/drawing/2014/main" id="{BC052159-12D0-4300-8B07-890AF53A1396}"/>
+              </a:ext>
+            </a:extLst>
+          </p:cNvPr>
+          <p:cNvCxnSpPr>
+            <a:stCxn id="42" idx="5"/>
+            <a:endCxn id="48" idx="0"/>
+          </p:cNvCxnSpPr>
+          <p:nvPr/>
+        </p:nvCxnSpPr>
+        <p:spPr>
+          <a:xfrm>
+            <a:off x="6285261" y="1954254"/>
+            <a:ext cx="1247040" cy="905074"/>
+          </a:xfrm>
+          <a:prstGeom prst="line">
+            <a:avLst/>
+          </a:prstGeom>
+        </p:spPr>
+        <p:style>
+          <a:lnRef idx="1">
+            <a:schemeClr val="dk1"/>
+          </a:lnRef>
+          <a:fillRef idx="0">
+            <a:schemeClr val="dk1"/>
+          </a:fillRef>
+          <a:effectRef idx="0">
+            <a:schemeClr val="dk1"/>
+          </a:effectRef>
+          <a:fontRef idx="minor">
+            <a:schemeClr val="tx1"/>
+          </a:fontRef>
+        </p:style>
+      </p:cxnSp>
+      <p:sp>
+        <p:nvSpPr>
+          <p:cNvPr id="49" name="타원 48">
+            <a:extLst>
+              <a:ext uri="{FF2B5EF4-FFF2-40B4-BE49-F238E27FC236}">
+                <a16:creationId xmlns:a16="http://schemas.microsoft.com/office/drawing/2014/main" id="{6A77E7DA-3680-42BE-9257-9E7451136604}"/>
+              </a:ext>
+            </a:extLst>
+          </p:cNvPr>
+          <p:cNvSpPr/>
+          <p:nvPr/>
+        </p:nvSpPr>
+        <p:spPr>
+          <a:xfrm>
+            <a:off x="8269937" y="4402381"/>
+            <a:ext cx="908420" cy="814387"/>
+          </a:xfrm>
+          <a:prstGeom prst="ellipse">
+            <a:avLst/>
+          </a:prstGeom>
+          <a:noFill/>
+        </p:spPr>
+        <p:style>
+          <a:lnRef idx="2">
+            <a:schemeClr val="dk1">
+              <a:shade val="50000"/>
+            </a:schemeClr>
+          </a:lnRef>
+          <a:fillRef idx="1">
+            <a:schemeClr val="dk1"/>
+          </a:fillRef>
+          <a:effectRef idx="0">
+            <a:schemeClr val="dk1"/>
+          </a:effectRef>
+          <a:fontRef idx="minor">
+            <a:schemeClr val="lt1"/>
+          </a:fontRef>
+        </p:style>
+        <p:txBody>
+          <a:bodyPr rtlCol="0" anchor="ctr"/>
+          <a:lstStyle/>
+          <a:p>
+            <a:pPr algn="ctr"/>
+            <a:r>
+              <a:rPr lang="en-US" altLang="ko-KR" sz="3200" dirty="0">
+                <a:solidFill>
+                  <a:schemeClr val="tx1"/>
+                </a:solidFill>
+              </a:rPr>
+              <a:t>10</a:t>
+            </a:r>
+            <a:endParaRPr lang="ko-KR" altLang="en-US" sz="3200" dirty="0">
+              <a:solidFill>
+                <a:schemeClr val="tx1"/>
+              </a:solidFill>
+            </a:endParaRPr>
+          </a:p>
+        </p:txBody>
+      </p:sp>
+      <p:cxnSp>
+        <p:nvCxnSpPr>
+          <p:cNvPr id="60" name="직선 연결선 59">
+            <a:extLst>
+              <a:ext uri="{FF2B5EF4-FFF2-40B4-BE49-F238E27FC236}">
+                <a16:creationId xmlns:a16="http://schemas.microsoft.com/office/drawing/2014/main" id="{74125205-87BC-4F44-A4AD-7B48B734FF8D}"/>
+              </a:ext>
+            </a:extLst>
+          </p:cNvPr>
+          <p:cNvCxnSpPr>
+            <a:cxnSpLocks/>
+            <a:stCxn id="48" idx="5"/>
+            <a:endCxn id="49" idx="0"/>
+          </p:cNvCxnSpPr>
+          <p:nvPr/>
+        </p:nvCxnSpPr>
+        <p:spPr>
+          <a:xfrm>
+            <a:off x="7830333" y="3554451"/>
+            <a:ext cx="893814" cy="847930"/>
+          </a:xfrm>
+          <a:prstGeom prst="line">
+            <a:avLst/>
+          </a:prstGeom>
+        </p:spPr>
+        <p:style>
+          <a:lnRef idx="1">
+            <a:schemeClr val="dk1"/>
+          </a:lnRef>
+          <a:fillRef idx="0">
+            <a:schemeClr val="dk1"/>
+          </a:fillRef>
+          <a:effectRef idx="0">
+            <a:schemeClr val="dk1"/>
+          </a:effectRef>
+          <a:fontRef idx="minor">
+            <a:schemeClr val="tx1"/>
+          </a:fontRef>
+        </p:style>
+      </p:cxnSp>
+    </p:spTree>
+    <p:extLst>
+      <p:ext uri="{BB962C8B-B14F-4D97-AF65-F5344CB8AC3E}">
+        <p14:creationId xmlns:p14="http://schemas.microsoft.com/office/powerpoint/2010/main" val="765607304"/>
+      </p:ext>
+    </p:extLst>
+  </p:cSld>
+  <p:clrMapOvr>
+    <a:masterClrMapping/>
+  </p:clrMapOvr>
+</p:sld>
+</file>
+
+<file path=ppt/slides/slide8.xml><?xml version="1.0" encoding="utf-8"?>
+<p:sld xmlns:a="http://schemas.openxmlformats.org/drawingml/2006/main" xmlns:r="http://schemas.openxmlformats.org/officeDocument/2006/relationships" xmlns:p="http://schemas.openxmlformats.org/presentationml/2006/main">
+  <p:cSld>
+    <p:spTree>
+      <p:nvGrpSpPr>
+        <p:cNvPr id="1" name=""/>
+        <p:cNvGrpSpPr/>
+        <p:nvPr/>
+      </p:nvGrpSpPr>
+      <p:grpSpPr>
+        <a:xfrm>
+          <a:off x="0" y="0"/>
+          <a:ext cx="0" cy="0"/>
+          <a:chOff x="0" y="0"/>
+          <a:chExt cx="0" cy="0"/>
+        </a:xfrm>
+      </p:grpSpPr>
+      <p:sp>
+        <p:nvSpPr>
+          <p:cNvPr id="42" name="타원 41">
+            <a:extLst>
+              <a:ext uri="{FF2B5EF4-FFF2-40B4-BE49-F238E27FC236}">
+                <a16:creationId xmlns:a16="http://schemas.microsoft.com/office/drawing/2014/main" id="{92ABCDEC-250B-40C0-8812-8B9257F6B78D}"/>
+              </a:ext>
+            </a:extLst>
+          </p:cNvPr>
+          <p:cNvSpPr/>
+          <p:nvPr/>
+        </p:nvSpPr>
+        <p:spPr>
+          <a:xfrm>
+            <a:off x="5565748" y="1259131"/>
+            <a:ext cx="842962" cy="814387"/>
+          </a:xfrm>
+          <a:prstGeom prst="ellipse">
+            <a:avLst/>
+          </a:prstGeom>
+          <a:noFill/>
+        </p:spPr>
+        <p:style>
+          <a:lnRef idx="2">
+            <a:schemeClr val="dk1">
+              <a:shade val="50000"/>
+            </a:schemeClr>
+          </a:lnRef>
+          <a:fillRef idx="1">
+            <a:schemeClr val="dk1"/>
+          </a:fillRef>
+          <a:effectRef idx="0">
+            <a:schemeClr val="dk1"/>
+          </a:effectRef>
+          <a:fontRef idx="minor">
+            <a:schemeClr val="lt1"/>
+          </a:fontRef>
+        </p:style>
+        <p:txBody>
+          <a:bodyPr rtlCol="0" anchor="ctr"/>
+          <a:lstStyle/>
+          <a:p>
+            <a:pPr algn="ctr"/>
+            <a:r>
+              <a:rPr lang="en-US" altLang="ko-KR" sz="3200" dirty="0">
+                <a:solidFill>
+                  <a:schemeClr val="tx1"/>
+                </a:solidFill>
+              </a:rPr>
+              <a:t>8</a:t>
+            </a:r>
+            <a:endParaRPr lang="ko-KR" altLang="en-US" sz="3200" dirty="0">
+              <a:solidFill>
+                <a:schemeClr val="tx1"/>
+              </a:solidFill>
+            </a:endParaRPr>
+          </a:p>
+        </p:txBody>
+      </p:sp>
+      <p:sp>
+        <p:nvSpPr>
+          <p:cNvPr id="47" name="타원 46">
+            <a:extLst>
+              <a:ext uri="{FF2B5EF4-FFF2-40B4-BE49-F238E27FC236}">
+                <a16:creationId xmlns:a16="http://schemas.microsoft.com/office/drawing/2014/main" id="{91893471-6591-4ACE-B7FD-2FE3D7EBE3A9}"/>
+              </a:ext>
+            </a:extLst>
+          </p:cNvPr>
+          <p:cNvSpPr/>
+          <p:nvPr/>
+        </p:nvSpPr>
+        <p:spPr>
+          <a:xfrm>
+            <a:off x="4120446" y="2859328"/>
+            <a:ext cx="842962" cy="814387"/>
+          </a:xfrm>
+          <a:prstGeom prst="ellipse">
+            <a:avLst/>
+          </a:prstGeom>
+          <a:noFill/>
+        </p:spPr>
+        <p:style>
+          <a:lnRef idx="2">
+            <a:schemeClr val="dk1">
+              <a:shade val="50000"/>
+            </a:schemeClr>
+          </a:lnRef>
+          <a:fillRef idx="1">
+            <a:schemeClr val="dk1"/>
+          </a:fillRef>
+          <a:effectRef idx="0">
+            <a:schemeClr val="dk1"/>
+          </a:effectRef>
+          <a:fontRef idx="minor">
+            <a:schemeClr val="lt1"/>
+          </a:fontRef>
+        </p:style>
+        <p:txBody>
+          <a:bodyPr rtlCol="0" anchor="ctr"/>
+          <a:lstStyle/>
+          <a:p>
+            <a:pPr algn="ctr"/>
+            <a:r>
+              <a:rPr lang="en-US" altLang="ko-KR" sz="3200" dirty="0">
+                <a:solidFill>
+                  <a:schemeClr val="tx1"/>
+                </a:solidFill>
+              </a:rPr>
+              <a:t>3</a:t>
+            </a:r>
+            <a:endParaRPr lang="ko-KR" altLang="en-US" sz="3200" dirty="0">
+              <a:solidFill>
+                <a:schemeClr val="tx1"/>
+              </a:solidFill>
+            </a:endParaRPr>
+          </a:p>
+        </p:txBody>
+      </p:sp>
+      <p:sp>
+        <p:nvSpPr>
+          <p:cNvPr id="48" name="타원 47">
+            <a:extLst>
+              <a:ext uri="{FF2B5EF4-FFF2-40B4-BE49-F238E27FC236}">
+                <a16:creationId xmlns:a16="http://schemas.microsoft.com/office/drawing/2014/main" id="{75833488-1488-4FC6-9393-C43992CEFD09}"/>
+              </a:ext>
+            </a:extLst>
+          </p:cNvPr>
+          <p:cNvSpPr/>
+          <p:nvPr/>
+        </p:nvSpPr>
+        <p:spPr>
+          <a:xfrm>
+            <a:off x="7110820" y="2859328"/>
+            <a:ext cx="924816" cy="814387"/>
+          </a:xfrm>
+          <a:prstGeom prst="ellipse">
+            <a:avLst/>
+          </a:prstGeom>
+          <a:noFill/>
+        </p:spPr>
+        <p:style>
+          <a:lnRef idx="2">
+            <a:schemeClr val="dk1">
+              <a:shade val="50000"/>
+            </a:schemeClr>
+          </a:lnRef>
+          <a:fillRef idx="1">
+            <a:schemeClr val="dk1"/>
+          </a:fillRef>
+          <a:effectRef idx="0">
+            <a:schemeClr val="dk1"/>
+          </a:effectRef>
+          <a:fontRef idx="minor">
+            <a:schemeClr val="lt1"/>
+          </a:fontRef>
+        </p:style>
+        <p:txBody>
+          <a:bodyPr rtlCol="0" anchor="ctr"/>
+          <a:lstStyle/>
+          <a:p>
+            <a:pPr algn="ctr"/>
+            <a:r>
+              <a:rPr lang="en-US" altLang="ko-KR" sz="3200" dirty="0">
+                <a:solidFill>
+                  <a:schemeClr val="tx1"/>
+                </a:solidFill>
+              </a:rPr>
+              <a:t>10</a:t>
+            </a:r>
+            <a:endParaRPr lang="ko-KR" altLang="en-US" sz="3200" dirty="0">
+              <a:solidFill>
+                <a:schemeClr val="tx1"/>
+              </a:solidFill>
+            </a:endParaRPr>
+          </a:p>
+        </p:txBody>
+      </p:sp>
+      <p:sp>
+        <p:nvSpPr>
+          <p:cNvPr id="50" name="타원 49">
+            <a:extLst>
+              <a:ext uri="{FF2B5EF4-FFF2-40B4-BE49-F238E27FC236}">
+                <a16:creationId xmlns:a16="http://schemas.microsoft.com/office/drawing/2014/main" id="{88AB90D7-60C5-42FD-B488-DB1174256B19}"/>
+              </a:ext>
+            </a:extLst>
+          </p:cNvPr>
+          <p:cNvSpPr/>
+          <p:nvPr/>
+        </p:nvSpPr>
+        <p:spPr>
+          <a:xfrm>
+            <a:off x="5227252" y="4402382"/>
+            <a:ext cx="842962" cy="814387"/>
+          </a:xfrm>
+          <a:prstGeom prst="ellipse">
+            <a:avLst/>
+          </a:prstGeom>
+          <a:noFill/>
+        </p:spPr>
+        <p:style>
+          <a:lnRef idx="2">
+            <a:schemeClr val="dk1">
+              <a:shade val="50000"/>
+            </a:schemeClr>
+          </a:lnRef>
+          <a:fillRef idx="1">
+            <a:schemeClr val="dk1"/>
+          </a:fillRef>
+          <a:effectRef idx="0">
+            <a:schemeClr val="dk1"/>
+          </a:effectRef>
+          <a:fontRef idx="minor">
+            <a:schemeClr val="lt1"/>
+          </a:fontRef>
+        </p:style>
+        <p:txBody>
+          <a:bodyPr rtlCol="0" anchor="ctr"/>
+          <a:lstStyle/>
+          <a:p>
+            <a:pPr algn="ctr"/>
+            <a:r>
+              <a:rPr lang="en-US" altLang="ko-KR" sz="3200" dirty="0">
+                <a:solidFill>
+                  <a:schemeClr val="tx1"/>
+                </a:solidFill>
+              </a:rPr>
+              <a:t>5</a:t>
+            </a:r>
+            <a:endParaRPr lang="ko-KR" altLang="en-US" sz="3200" dirty="0">
+              <a:solidFill>
+                <a:schemeClr val="tx1"/>
+              </a:solidFill>
+            </a:endParaRPr>
+          </a:p>
+        </p:txBody>
+      </p:sp>
+      <p:sp>
+        <p:nvSpPr>
+          <p:cNvPr id="51" name="타원 50">
+            <a:extLst>
+              <a:ext uri="{FF2B5EF4-FFF2-40B4-BE49-F238E27FC236}">
+                <a16:creationId xmlns:a16="http://schemas.microsoft.com/office/drawing/2014/main" id="{76613553-D7D1-454D-A29D-7E72623E935E}"/>
+              </a:ext>
+            </a:extLst>
+          </p:cNvPr>
+          <p:cNvSpPr/>
+          <p:nvPr/>
+        </p:nvSpPr>
+        <p:spPr>
+          <a:xfrm>
+            <a:off x="3013643" y="4402382"/>
+            <a:ext cx="842962" cy="814387"/>
+          </a:xfrm>
+          <a:prstGeom prst="ellipse">
+            <a:avLst/>
+          </a:prstGeom>
+          <a:noFill/>
+        </p:spPr>
+        <p:style>
+          <a:lnRef idx="2">
+            <a:schemeClr val="dk1">
+              <a:shade val="50000"/>
+            </a:schemeClr>
+          </a:lnRef>
+          <a:fillRef idx="1">
+            <a:schemeClr val="dk1"/>
+          </a:fillRef>
+          <a:effectRef idx="0">
+            <a:schemeClr val="dk1"/>
+          </a:effectRef>
+          <a:fontRef idx="minor">
+            <a:schemeClr val="lt1"/>
+          </a:fontRef>
+        </p:style>
+        <p:txBody>
+          <a:bodyPr rtlCol="0" anchor="ctr"/>
+          <a:lstStyle/>
+          <a:p>
+            <a:pPr algn="ctr"/>
+            <a:r>
+              <a:rPr lang="en-US" altLang="ko-KR" sz="3200" dirty="0">
+                <a:solidFill>
+                  <a:schemeClr val="tx1"/>
+                </a:solidFill>
+              </a:rPr>
+              <a:t>1</a:t>
+            </a:r>
+            <a:endParaRPr lang="ko-KR" altLang="en-US" sz="3200" dirty="0">
+              <a:solidFill>
+                <a:schemeClr val="tx1"/>
+              </a:solidFill>
+            </a:endParaRPr>
+          </a:p>
+        </p:txBody>
+      </p:sp>
+      <p:cxnSp>
+        <p:nvCxnSpPr>
+          <p:cNvPr id="16" name="직선 연결선 15">
+            <a:extLst>
+              <a:ext uri="{FF2B5EF4-FFF2-40B4-BE49-F238E27FC236}">
+                <a16:creationId xmlns:a16="http://schemas.microsoft.com/office/drawing/2014/main" id="{A5DC94D9-2D54-4AFF-96DD-C4484055E7A6}"/>
+              </a:ext>
+            </a:extLst>
+          </p:cNvPr>
+          <p:cNvCxnSpPr>
+            <a:stCxn id="42" idx="3"/>
+            <a:endCxn id="47" idx="0"/>
+          </p:cNvCxnSpPr>
+          <p:nvPr/>
+        </p:nvCxnSpPr>
+        <p:spPr>
+          <a:xfrm flipH="1">
+            <a:off x="4541927" y="1954254"/>
+            <a:ext cx="1147270" cy="905074"/>
+          </a:xfrm>
+          <a:prstGeom prst="line">
+            <a:avLst/>
+          </a:prstGeom>
+        </p:spPr>
+        <p:style>
+          <a:lnRef idx="1">
+            <a:schemeClr val="dk1"/>
+          </a:lnRef>
+          <a:fillRef idx="0">
+            <a:schemeClr val="dk1"/>
+          </a:fillRef>
+          <a:effectRef idx="0">
+            <a:schemeClr val="dk1"/>
+          </a:effectRef>
+          <a:fontRef idx="minor">
+            <a:schemeClr val="tx1"/>
+          </a:fontRef>
+        </p:style>
+      </p:cxnSp>
+      <p:cxnSp>
+        <p:nvCxnSpPr>
+          <p:cNvPr id="18" name="직선 연결선 17">
+            <a:extLst>
+              <a:ext uri="{FF2B5EF4-FFF2-40B4-BE49-F238E27FC236}">
+                <a16:creationId xmlns:a16="http://schemas.microsoft.com/office/drawing/2014/main" id="{7F131259-FAE2-4864-8844-285D43D73BBB}"/>
+              </a:ext>
+            </a:extLst>
+          </p:cNvPr>
+          <p:cNvCxnSpPr>
+            <a:stCxn id="47" idx="3"/>
+            <a:endCxn id="51" idx="0"/>
+          </p:cNvCxnSpPr>
+          <p:nvPr/>
+        </p:nvCxnSpPr>
+        <p:spPr>
+          <a:xfrm flipH="1">
+            <a:off x="3435124" y="3554451"/>
+            <a:ext cx="808771" cy="847931"/>
+          </a:xfrm>
+          <a:prstGeom prst="line">
+            <a:avLst/>
+          </a:prstGeom>
+        </p:spPr>
+        <p:style>
+          <a:lnRef idx="1">
+            <a:schemeClr val="dk1"/>
+          </a:lnRef>
+          <a:fillRef idx="0">
+            <a:schemeClr val="dk1"/>
+          </a:fillRef>
+          <a:effectRef idx="0">
+            <a:schemeClr val="dk1"/>
+          </a:effectRef>
+          <a:fontRef idx="minor">
+            <a:schemeClr val="tx1"/>
+          </a:fontRef>
+        </p:style>
+      </p:cxnSp>
+      <p:cxnSp>
+        <p:nvCxnSpPr>
+          <p:cNvPr id="20" name="직선 연결선 19">
+            <a:extLst>
+              <a:ext uri="{FF2B5EF4-FFF2-40B4-BE49-F238E27FC236}">
+                <a16:creationId xmlns:a16="http://schemas.microsoft.com/office/drawing/2014/main" id="{0B8E17D1-D681-4B9F-836B-B5D5C002EB81}"/>
+              </a:ext>
+            </a:extLst>
+          </p:cNvPr>
+          <p:cNvCxnSpPr>
+            <a:stCxn id="47" idx="5"/>
+            <a:endCxn id="50" idx="0"/>
+          </p:cNvCxnSpPr>
+          <p:nvPr/>
+        </p:nvCxnSpPr>
+        <p:spPr>
+          <a:xfrm>
+            <a:off x="4839959" y="3554451"/>
+            <a:ext cx="808774" cy="847931"/>
+          </a:xfrm>
+          <a:prstGeom prst="line">
+            <a:avLst/>
+          </a:prstGeom>
+        </p:spPr>
+        <p:style>
+          <a:lnRef idx="1">
+            <a:schemeClr val="dk1"/>
+          </a:lnRef>
+          <a:fillRef idx="0">
+            <a:schemeClr val="dk1"/>
+          </a:fillRef>
+          <a:effectRef idx="0">
+            <a:schemeClr val="dk1"/>
+          </a:effectRef>
+          <a:fontRef idx="minor">
+            <a:schemeClr val="tx1"/>
+          </a:fontRef>
+        </p:style>
+      </p:cxnSp>
+      <p:cxnSp>
+        <p:nvCxnSpPr>
+          <p:cNvPr id="29" name="직선 연결선 28">
+            <a:extLst>
+              <a:ext uri="{FF2B5EF4-FFF2-40B4-BE49-F238E27FC236}">
+                <a16:creationId xmlns:a16="http://schemas.microsoft.com/office/drawing/2014/main" id="{BC052159-12D0-4300-8B07-890AF53A1396}"/>
+              </a:ext>
+            </a:extLst>
+          </p:cNvPr>
+          <p:cNvCxnSpPr>
+            <a:cxnSpLocks/>
+            <a:stCxn id="42" idx="5"/>
+            <a:endCxn id="48" idx="0"/>
+          </p:cNvCxnSpPr>
+          <p:nvPr/>
+        </p:nvCxnSpPr>
+        <p:spPr>
+          <a:xfrm>
+            <a:off x="6285261" y="1954254"/>
+            <a:ext cx="1287967" cy="905074"/>
+          </a:xfrm>
+          <a:prstGeom prst="line">
+            <a:avLst/>
+          </a:prstGeom>
+        </p:spPr>
+        <p:style>
+          <a:lnRef idx="1">
+            <a:schemeClr val="dk1"/>
+          </a:lnRef>
+          <a:fillRef idx="0">
+            <a:schemeClr val="dk1"/>
+          </a:fillRef>
+          <a:effectRef idx="0">
+            <a:schemeClr val="dk1"/>
+          </a:effectRef>
+          <a:fontRef idx="minor">
+            <a:schemeClr val="tx1"/>
+          </a:fontRef>
+        </p:style>
+      </p:cxnSp>
+    </p:spTree>
+    <p:extLst>
+      <p:ext uri="{BB962C8B-B14F-4D97-AF65-F5344CB8AC3E}">
+        <p14:creationId xmlns:p14="http://schemas.microsoft.com/office/powerpoint/2010/main" val="157222071"/>
       </p:ext>
     </p:extLst>
   </p:cSld>

</xml_diff>